<commit_message>
small changes in powerpoint and test
</commit_message>
<xml_diff>
--- a/Mario’s PizzaBar.pptx
+++ b/Mario’s PizzaBar.pptx
@@ -7,10 +7,8 @@
   <p:sldIdLst>
     <p:sldId id="256" r:id="rId2"/>
     <p:sldId id="257" r:id="rId3"/>
-    <p:sldId id="258" r:id="rId4"/>
-    <p:sldId id="259" r:id="rId5"/>
-    <p:sldId id="260" r:id="rId6"/>
-    <p:sldId id="261" r:id="rId7"/>
+    <p:sldId id="260" r:id="rId4"/>
+    <p:sldId id="261" r:id="rId5"/>
   </p:sldIdLst>
   <p:sldSz cx="12192000" cy="6858000"/>
   <p:notesSz cx="6858000" cy="9144000"/>
@@ -109,6 +107,11 @@
       </a:defRPr>
     </a:lvl9pPr>
   </p:defaultTextStyle>
+  <p:extLst>
+    <p:ext uri="{EFAFB233-063F-42B5-8137-9DF3F51BA10A}">
+      <p15:sldGuideLst xmlns:p15="http://schemas.microsoft.com/office/powerpoint/2012/main"/>
+    </p:ext>
+  </p:extLst>
 </p:presentation>
 </file>
 
@@ -154,7 +157,7 @@
           </a:lstStyle>
           <a:p>
             <a:r>
-              <a:rPr lang="da-DK" smtClean="0"/>
+              <a:rPr lang="da-DK"/>
               <a:t>Klik for at redigere i master</a:t>
             </a:r>
             <a:endParaRPr lang="en-GB"/>
@@ -219,7 +222,7 @@
           </a:lstStyle>
           <a:p>
             <a:r>
-              <a:rPr lang="da-DK" smtClean="0"/>
+              <a:rPr lang="da-DK"/>
               <a:t>Klik for at redigere undertiteltypografien i masteren</a:t>
             </a:r>
             <a:endParaRPr lang="en-GB"/>
@@ -243,7 +246,7 @@
           <a:p>
             <a:fld id="{BE7058B1-1F87-4484-B760-EC0DCF70A045}" type="datetimeFigureOut">
               <a:rPr lang="en-GB" smtClean="0"/>
-              <a:t>22/04/2021</a:t>
+              <a:t>25/04/2021</a:t>
             </a:fld>
             <a:endParaRPr lang="en-GB"/>
           </a:p>
@@ -337,7 +340,7 @@
           <a:lstStyle/>
           <a:p>
             <a:r>
-              <a:rPr lang="da-DK" smtClean="0"/>
+              <a:rPr lang="da-DK"/>
               <a:t>Klik for at redigere i master</a:t>
             </a:r>
             <a:endParaRPr lang="en-GB"/>
@@ -361,35 +364,35 @@
           <a:p>
             <a:pPr lvl="0"/>
             <a:r>
-              <a:rPr lang="da-DK" smtClean="0"/>
+              <a:rPr lang="da-DK"/>
               <a:t>Rediger typografien i masterens</a:t>
             </a:r>
           </a:p>
           <a:p>
             <a:pPr lvl="1"/>
             <a:r>
-              <a:rPr lang="da-DK" smtClean="0"/>
+              <a:rPr lang="da-DK"/>
               <a:t>Andet niveau</a:t>
             </a:r>
           </a:p>
           <a:p>
             <a:pPr lvl="2"/>
             <a:r>
-              <a:rPr lang="da-DK" smtClean="0"/>
+              <a:rPr lang="da-DK"/>
               <a:t>Tredje niveau</a:t>
             </a:r>
           </a:p>
           <a:p>
             <a:pPr lvl="3"/>
             <a:r>
-              <a:rPr lang="da-DK" smtClean="0"/>
+              <a:rPr lang="da-DK"/>
               <a:t>Fjerde niveau</a:t>
             </a:r>
           </a:p>
           <a:p>
             <a:pPr lvl="4"/>
             <a:r>
-              <a:rPr lang="da-DK" smtClean="0"/>
+              <a:rPr lang="da-DK"/>
               <a:t>Femte niveau</a:t>
             </a:r>
             <a:endParaRPr lang="en-GB"/>
@@ -413,7 +416,7 @@
           <a:p>
             <a:fld id="{BE7058B1-1F87-4484-B760-EC0DCF70A045}" type="datetimeFigureOut">
               <a:rPr lang="en-GB" smtClean="0"/>
-              <a:t>22/04/2021</a:t>
+              <a:t>25/04/2021</a:t>
             </a:fld>
             <a:endParaRPr lang="en-GB"/>
           </a:p>
@@ -512,7 +515,7 @@
           <a:lstStyle/>
           <a:p>
             <a:r>
-              <a:rPr lang="da-DK" smtClean="0"/>
+              <a:rPr lang="da-DK"/>
               <a:t>Klik for at redigere i master</a:t>
             </a:r>
             <a:endParaRPr lang="en-GB"/>
@@ -541,35 +544,35 @@
           <a:p>
             <a:pPr lvl="0"/>
             <a:r>
-              <a:rPr lang="da-DK" smtClean="0"/>
+              <a:rPr lang="da-DK"/>
               <a:t>Rediger typografien i masterens</a:t>
             </a:r>
           </a:p>
           <a:p>
             <a:pPr lvl="1"/>
             <a:r>
-              <a:rPr lang="da-DK" smtClean="0"/>
+              <a:rPr lang="da-DK"/>
               <a:t>Andet niveau</a:t>
             </a:r>
           </a:p>
           <a:p>
             <a:pPr lvl="2"/>
             <a:r>
-              <a:rPr lang="da-DK" smtClean="0"/>
+              <a:rPr lang="da-DK"/>
               <a:t>Tredje niveau</a:t>
             </a:r>
           </a:p>
           <a:p>
             <a:pPr lvl="3"/>
             <a:r>
-              <a:rPr lang="da-DK" smtClean="0"/>
+              <a:rPr lang="da-DK"/>
               <a:t>Fjerde niveau</a:t>
             </a:r>
           </a:p>
           <a:p>
             <a:pPr lvl="4"/>
             <a:r>
-              <a:rPr lang="da-DK" smtClean="0"/>
+              <a:rPr lang="da-DK"/>
               <a:t>Femte niveau</a:t>
             </a:r>
             <a:endParaRPr lang="en-GB"/>
@@ -593,7 +596,7 @@
           <a:p>
             <a:fld id="{BE7058B1-1F87-4484-B760-EC0DCF70A045}" type="datetimeFigureOut">
               <a:rPr lang="en-GB" smtClean="0"/>
-              <a:t>22/04/2021</a:t>
+              <a:t>25/04/2021</a:t>
             </a:fld>
             <a:endParaRPr lang="en-GB"/>
           </a:p>
@@ -687,7 +690,7 @@
           <a:lstStyle/>
           <a:p>
             <a:r>
-              <a:rPr lang="da-DK" smtClean="0"/>
+              <a:rPr lang="da-DK"/>
               <a:t>Klik for at redigere i master</a:t>
             </a:r>
             <a:endParaRPr lang="en-GB"/>
@@ -711,35 +714,35 @@
           <a:p>
             <a:pPr lvl="0"/>
             <a:r>
-              <a:rPr lang="da-DK" smtClean="0"/>
+              <a:rPr lang="da-DK"/>
               <a:t>Rediger typografien i masterens</a:t>
             </a:r>
           </a:p>
           <a:p>
             <a:pPr lvl="1"/>
             <a:r>
-              <a:rPr lang="da-DK" smtClean="0"/>
+              <a:rPr lang="da-DK"/>
               <a:t>Andet niveau</a:t>
             </a:r>
           </a:p>
           <a:p>
             <a:pPr lvl="2"/>
             <a:r>
-              <a:rPr lang="da-DK" smtClean="0"/>
+              <a:rPr lang="da-DK"/>
               <a:t>Tredje niveau</a:t>
             </a:r>
           </a:p>
           <a:p>
             <a:pPr lvl="3"/>
             <a:r>
-              <a:rPr lang="da-DK" smtClean="0"/>
+              <a:rPr lang="da-DK"/>
               <a:t>Fjerde niveau</a:t>
             </a:r>
           </a:p>
           <a:p>
             <a:pPr lvl="4"/>
             <a:r>
-              <a:rPr lang="da-DK" smtClean="0"/>
+              <a:rPr lang="da-DK"/>
               <a:t>Femte niveau</a:t>
             </a:r>
             <a:endParaRPr lang="en-GB"/>
@@ -763,7 +766,7 @@
           <a:p>
             <a:fld id="{BE7058B1-1F87-4484-B760-EC0DCF70A045}" type="datetimeFigureOut">
               <a:rPr lang="en-GB" smtClean="0"/>
-              <a:t>22/04/2021</a:t>
+              <a:t>25/04/2021</a:t>
             </a:fld>
             <a:endParaRPr lang="en-GB"/>
           </a:p>
@@ -866,7 +869,7 @@
           </a:lstStyle>
           <a:p>
             <a:r>
-              <a:rPr lang="da-DK" smtClean="0"/>
+              <a:rPr lang="da-DK"/>
               <a:t>Klik for at redigere i master</a:t>
             </a:r>
             <a:endParaRPr lang="en-GB"/>
@@ -986,7 +989,7 @@
           <a:p>
             <a:pPr lvl="0"/>
             <a:r>
-              <a:rPr lang="da-DK" smtClean="0"/>
+              <a:rPr lang="da-DK"/>
               <a:t>Rediger typografien i masterens</a:t>
             </a:r>
           </a:p>
@@ -1009,7 +1012,7 @@
           <a:p>
             <a:fld id="{BE7058B1-1F87-4484-B760-EC0DCF70A045}" type="datetimeFigureOut">
               <a:rPr lang="en-GB" smtClean="0"/>
-              <a:t>22/04/2021</a:t>
+              <a:t>25/04/2021</a:t>
             </a:fld>
             <a:endParaRPr lang="en-GB"/>
           </a:p>
@@ -1103,7 +1106,7 @@
           <a:lstStyle/>
           <a:p>
             <a:r>
-              <a:rPr lang="da-DK" smtClean="0"/>
+              <a:rPr lang="da-DK"/>
               <a:t>Klik for at redigere i master</a:t>
             </a:r>
             <a:endParaRPr lang="en-GB"/>
@@ -1132,35 +1135,35 @@
           <a:p>
             <a:pPr lvl="0"/>
             <a:r>
-              <a:rPr lang="da-DK" smtClean="0"/>
+              <a:rPr lang="da-DK"/>
               <a:t>Rediger typografien i masterens</a:t>
             </a:r>
           </a:p>
           <a:p>
             <a:pPr lvl="1"/>
             <a:r>
-              <a:rPr lang="da-DK" smtClean="0"/>
+              <a:rPr lang="da-DK"/>
               <a:t>Andet niveau</a:t>
             </a:r>
           </a:p>
           <a:p>
             <a:pPr lvl="2"/>
             <a:r>
-              <a:rPr lang="da-DK" smtClean="0"/>
+              <a:rPr lang="da-DK"/>
               <a:t>Tredje niveau</a:t>
             </a:r>
           </a:p>
           <a:p>
             <a:pPr lvl="3"/>
             <a:r>
-              <a:rPr lang="da-DK" smtClean="0"/>
+              <a:rPr lang="da-DK"/>
               <a:t>Fjerde niveau</a:t>
             </a:r>
           </a:p>
           <a:p>
             <a:pPr lvl="4"/>
             <a:r>
-              <a:rPr lang="da-DK" smtClean="0"/>
+              <a:rPr lang="da-DK"/>
               <a:t>Femte niveau</a:t>
             </a:r>
             <a:endParaRPr lang="en-GB"/>
@@ -1189,35 +1192,35 @@
           <a:p>
             <a:pPr lvl="0"/>
             <a:r>
-              <a:rPr lang="da-DK" smtClean="0"/>
+              <a:rPr lang="da-DK"/>
               <a:t>Rediger typografien i masterens</a:t>
             </a:r>
           </a:p>
           <a:p>
             <a:pPr lvl="1"/>
             <a:r>
-              <a:rPr lang="da-DK" smtClean="0"/>
+              <a:rPr lang="da-DK"/>
               <a:t>Andet niveau</a:t>
             </a:r>
           </a:p>
           <a:p>
             <a:pPr lvl="2"/>
             <a:r>
-              <a:rPr lang="da-DK" smtClean="0"/>
+              <a:rPr lang="da-DK"/>
               <a:t>Tredje niveau</a:t>
             </a:r>
           </a:p>
           <a:p>
             <a:pPr lvl="3"/>
             <a:r>
-              <a:rPr lang="da-DK" smtClean="0"/>
+              <a:rPr lang="da-DK"/>
               <a:t>Fjerde niveau</a:t>
             </a:r>
           </a:p>
           <a:p>
             <a:pPr lvl="4"/>
             <a:r>
-              <a:rPr lang="da-DK" smtClean="0"/>
+              <a:rPr lang="da-DK"/>
               <a:t>Femte niveau</a:t>
             </a:r>
             <a:endParaRPr lang="en-GB"/>
@@ -1241,7 +1244,7 @@
           <a:p>
             <a:fld id="{BE7058B1-1F87-4484-B760-EC0DCF70A045}" type="datetimeFigureOut">
               <a:rPr lang="en-GB" smtClean="0"/>
-              <a:t>22/04/2021</a:t>
+              <a:t>25/04/2021</a:t>
             </a:fld>
             <a:endParaRPr lang="en-GB"/>
           </a:p>
@@ -1340,7 +1343,7 @@
           <a:lstStyle/>
           <a:p>
             <a:r>
-              <a:rPr lang="da-DK" smtClean="0"/>
+              <a:rPr lang="da-DK"/>
               <a:t>Klik for at redigere i master</a:t>
             </a:r>
             <a:endParaRPr lang="en-GB"/>
@@ -1406,7 +1409,7 @@
           <a:p>
             <a:pPr lvl="0"/>
             <a:r>
-              <a:rPr lang="da-DK" smtClean="0"/>
+              <a:rPr lang="da-DK"/>
               <a:t>Rediger typografien i masterens</a:t>
             </a:r>
           </a:p>
@@ -1434,35 +1437,35 @@
           <a:p>
             <a:pPr lvl="0"/>
             <a:r>
-              <a:rPr lang="da-DK" smtClean="0"/>
+              <a:rPr lang="da-DK"/>
               <a:t>Rediger typografien i masterens</a:t>
             </a:r>
           </a:p>
           <a:p>
             <a:pPr lvl="1"/>
             <a:r>
-              <a:rPr lang="da-DK" smtClean="0"/>
+              <a:rPr lang="da-DK"/>
               <a:t>Andet niveau</a:t>
             </a:r>
           </a:p>
           <a:p>
             <a:pPr lvl="2"/>
             <a:r>
-              <a:rPr lang="da-DK" smtClean="0"/>
+              <a:rPr lang="da-DK"/>
               <a:t>Tredje niveau</a:t>
             </a:r>
           </a:p>
           <a:p>
             <a:pPr lvl="3"/>
             <a:r>
-              <a:rPr lang="da-DK" smtClean="0"/>
+              <a:rPr lang="da-DK"/>
               <a:t>Fjerde niveau</a:t>
             </a:r>
           </a:p>
           <a:p>
             <a:pPr lvl="4"/>
             <a:r>
-              <a:rPr lang="da-DK" smtClean="0"/>
+              <a:rPr lang="da-DK"/>
               <a:t>Femte niveau</a:t>
             </a:r>
             <a:endParaRPr lang="en-GB"/>
@@ -1528,7 +1531,7 @@
           <a:p>
             <a:pPr lvl="0"/>
             <a:r>
-              <a:rPr lang="da-DK" smtClean="0"/>
+              <a:rPr lang="da-DK"/>
               <a:t>Rediger typografien i masterens</a:t>
             </a:r>
           </a:p>
@@ -1556,35 +1559,35 @@
           <a:p>
             <a:pPr lvl="0"/>
             <a:r>
-              <a:rPr lang="da-DK" smtClean="0"/>
+              <a:rPr lang="da-DK"/>
               <a:t>Rediger typografien i masterens</a:t>
             </a:r>
           </a:p>
           <a:p>
             <a:pPr lvl="1"/>
             <a:r>
-              <a:rPr lang="da-DK" smtClean="0"/>
+              <a:rPr lang="da-DK"/>
               <a:t>Andet niveau</a:t>
             </a:r>
           </a:p>
           <a:p>
             <a:pPr lvl="2"/>
             <a:r>
-              <a:rPr lang="da-DK" smtClean="0"/>
+              <a:rPr lang="da-DK"/>
               <a:t>Tredje niveau</a:t>
             </a:r>
           </a:p>
           <a:p>
             <a:pPr lvl="3"/>
             <a:r>
-              <a:rPr lang="da-DK" smtClean="0"/>
+              <a:rPr lang="da-DK"/>
               <a:t>Fjerde niveau</a:t>
             </a:r>
           </a:p>
           <a:p>
             <a:pPr lvl="4"/>
             <a:r>
-              <a:rPr lang="da-DK" smtClean="0"/>
+              <a:rPr lang="da-DK"/>
               <a:t>Femte niveau</a:t>
             </a:r>
             <a:endParaRPr lang="en-GB"/>
@@ -1608,7 +1611,7 @@
           <a:p>
             <a:fld id="{BE7058B1-1F87-4484-B760-EC0DCF70A045}" type="datetimeFigureOut">
               <a:rPr lang="en-GB" smtClean="0"/>
-              <a:t>22/04/2021</a:t>
+              <a:t>25/04/2021</a:t>
             </a:fld>
             <a:endParaRPr lang="en-GB"/>
           </a:p>
@@ -1702,7 +1705,7 @@
           <a:lstStyle/>
           <a:p>
             <a:r>
-              <a:rPr lang="da-DK" smtClean="0"/>
+              <a:rPr lang="da-DK"/>
               <a:t>Klik for at redigere i master</a:t>
             </a:r>
             <a:endParaRPr lang="en-GB"/>
@@ -1726,7 +1729,7 @@
           <a:p>
             <a:fld id="{BE7058B1-1F87-4484-B760-EC0DCF70A045}" type="datetimeFigureOut">
               <a:rPr lang="en-GB" smtClean="0"/>
-              <a:t>22/04/2021</a:t>
+              <a:t>25/04/2021</a:t>
             </a:fld>
             <a:endParaRPr lang="en-GB"/>
           </a:p>
@@ -1821,7 +1824,7 @@
           <a:p>
             <a:fld id="{BE7058B1-1F87-4484-B760-EC0DCF70A045}" type="datetimeFigureOut">
               <a:rPr lang="en-GB" smtClean="0"/>
-              <a:t>22/04/2021</a:t>
+              <a:t>25/04/2021</a:t>
             </a:fld>
             <a:endParaRPr lang="en-GB"/>
           </a:p>
@@ -1924,7 +1927,7 @@
           </a:lstStyle>
           <a:p>
             <a:r>
-              <a:rPr lang="da-DK" smtClean="0"/>
+              <a:rPr lang="da-DK"/>
               <a:t>Klik for at redigere i master</a:t>
             </a:r>
             <a:endParaRPr lang="en-GB"/>
@@ -1981,35 +1984,35 @@
           <a:p>
             <a:pPr lvl="0"/>
             <a:r>
-              <a:rPr lang="da-DK" smtClean="0"/>
+              <a:rPr lang="da-DK"/>
               <a:t>Rediger typografien i masterens</a:t>
             </a:r>
           </a:p>
           <a:p>
             <a:pPr lvl="1"/>
             <a:r>
-              <a:rPr lang="da-DK" smtClean="0"/>
+              <a:rPr lang="da-DK"/>
               <a:t>Andet niveau</a:t>
             </a:r>
           </a:p>
           <a:p>
             <a:pPr lvl="2"/>
             <a:r>
-              <a:rPr lang="da-DK" smtClean="0"/>
+              <a:rPr lang="da-DK"/>
               <a:t>Tredje niveau</a:t>
             </a:r>
           </a:p>
           <a:p>
             <a:pPr lvl="3"/>
             <a:r>
-              <a:rPr lang="da-DK" smtClean="0"/>
+              <a:rPr lang="da-DK"/>
               <a:t>Fjerde niveau</a:t>
             </a:r>
           </a:p>
           <a:p>
             <a:pPr lvl="4"/>
             <a:r>
-              <a:rPr lang="da-DK" smtClean="0"/>
+              <a:rPr lang="da-DK"/>
               <a:t>Femte niveau</a:t>
             </a:r>
             <a:endParaRPr lang="en-GB"/>
@@ -2075,7 +2078,7 @@
           <a:p>
             <a:pPr lvl="0"/>
             <a:r>
-              <a:rPr lang="da-DK" smtClean="0"/>
+              <a:rPr lang="da-DK"/>
               <a:t>Rediger typografien i masterens</a:t>
             </a:r>
           </a:p>
@@ -2098,7 +2101,7 @@
           <a:p>
             <a:fld id="{BE7058B1-1F87-4484-B760-EC0DCF70A045}" type="datetimeFigureOut">
               <a:rPr lang="en-GB" smtClean="0"/>
-              <a:t>22/04/2021</a:t>
+              <a:t>25/04/2021</a:t>
             </a:fld>
             <a:endParaRPr lang="en-GB"/>
           </a:p>
@@ -2201,7 +2204,7 @@
           </a:lstStyle>
           <a:p>
             <a:r>
-              <a:rPr lang="da-DK" smtClean="0"/>
+              <a:rPr lang="da-DK"/>
               <a:t>Klik for at redigere i master</a:t>
             </a:r>
             <a:endParaRPr lang="en-GB"/>
@@ -2328,7 +2331,7 @@
           <a:p>
             <a:pPr lvl="0"/>
             <a:r>
-              <a:rPr lang="da-DK" smtClean="0"/>
+              <a:rPr lang="da-DK"/>
               <a:t>Rediger typografien i masterens</a:t>
             </a:r>
           </a:p>
@@ -2351,7 +2354,7 @@
           <a:p>
             <a:fld id="{BE7058B1-1F87-4484-B760-EC0DCF70A045}" type="datetimeFigureOut">
               <a:rPr lang="en-GB" smtClean="0"/>
-              <a:t>22/04/2021</a:t>
+              <a:t>25/04/2021</a:t>
             </a:fld>
             <a:endParaRPr lang="en-GB"/>
           </a:p>
@@ -2460,7 +2463,7 @@
           <a:lstStyle/>
           <a:p>
             <a:r>
-              <a:rPr lang="da-DK" smtClean="0"/>
+              <a:rPr lang="da-DK"/>
               <a:t>Klik for at redigere i master</a:t>
             </a:r>
             <a:endParaRPr lang="en-GB"/>
@@ -2494,35 +2497,35 @@
           <a:p>
             <a:pPr lvl="0"/>
             <a:r>
-              <a:rPr lang="da-DK" smtClean="0"/>
+              <a:rPr lang="da-DK"/>
               <a:t>Rediger typografien i masterens</a:t>
             </a:r>
           </a:p>
           <a:p>
             <a:pPr lvl="1"/>
             <a:r>
-              <a:rPr lang="da-DK" smtClean="0"/>
+              <a:rPr lang="da-DK"/>
               <a:t>Andet niveau</a:t>
             </a:r>
           </a:p>
           <a:p>
             <a:pPr lvl="2"/>
             <a:r>
-              <a:rPr lang="da-DK" smtClean="0"/>
+              <a:rPr lang="da-DK"/>
               <a:t>Tredje niveau</a:t>
             </a:r>
           </a:p>
           <a:p>
             <a:pPr lvl="3"/>
             <a:r>
-              <a:rPr lang="da-DK" smtClean="0"/>
+              <a:rPr lang="da-DK"/>
               <a:t>Fjerde niveau</a:t>
             </a:r>
           </a:p>
           <a:p>
             <a:pPr lvl="4"/>
             <a:r>
-              <a:rPr lang="da-DK" smtClean="0"/>
+              <a:rPr lang="da-DK"/>
               <a:t>Femte niveau</a:t>
             </a:r>
             <a:endParaRPr lang="en-GB"/>
@@ -2564,7 +2567,7 @@
           <a:p>
             <a:fld id="{BE7058B1-1F87-4484-B760-EC0DCF70A045}" type="datetimeFigureOut">
               <a:rPr lang="en-GB" smtClean="0"/>
-              <a:t>22/04/2021</a:t>
+              <a:t>25/04/2021</a:t>
             </a:fld>
             <a:endParaRPr lang="en-GB"/>
           </a:p>
@@ -2955,6 +2958,14 @@
 <file path=ppt/slides/slide1.xml><?xml version="1.0" encoding="utf-8"?>
 <p:sld xmlns:a="http://schemas.openxmlformats.org/drawingml/2006/main" xmlns:r="http://schemas.openxmlformats.org/officeDocument/2006/relationships" xmlns:p="http://schemas.openxmlformats.org/presentationml/2006/main">
   <p:cSld>
+    <p:bg>
+      <p:bgPr>
+        <a:solidFill>
+          <a:schemeClr val="bg1"/>
+        </a:solidFill>
+        <a:effectLst/>
+      </p:bgPr>
+    </p:bg>
     <p:spTree>
       <p:nvGrpSpPr>
         <p:cNvPr id="1" name=""/>
@@ -2969,6 +2980,66 @@
           <a:chExt cx="0" cy="0"/>
         </a:xfrm>
       </p:grpSpPr>
+      <p:sp useBgFill="1">
+        <p:nvSpPr>
+          <p:cNvPr id="9" name="Rectangle 8">
+            <a:extLst>
+              <a:ext uri="{FF2B5EF4-FFF2-40B4-BE49-F238E27FC236}">
+                <a16:creationId xmlns:a16="http://schemas.microsoft.com/office/drawing/2014/main" id="{362D44EE-C852-4460-B8B5-C4F2BC20510C}"/>
+              </a:ext>
+              <a:ext uri="{C183D7F6-B498-43B3-948B-1728B52AA6E4}">
+                <adec:decorative xmlns:adec="http://schemas.microsoft.com/office/drawing/2017/decorative" val="1"/>
+              </a:ext>
+            </a:extLst>
+          </p:cNvPr>
+          <p:cNvSpPr>
+            <a:spLocks noGrp="1" noRot="1" noChangeAspect="1" noMove="1" noResize="1" noEditPoints="1" noAdjustHandles="1" noChangeArrowheads="1" noChangeShapeType="1" noTextEdit="1"/>
+          </p:cNvSpPr>
+          <p:nvPr>
+            <p:extLst>
+              <p:ext uri="{386F3935-93C4-4BCD-93E2-E3B085C9AB24}">
+                <p16:designElem xmlns:p16="http://schemas.microsoft.com/office/powerpoint/2015/main" val="1"/>
+              </p:ext>
+            </p:extLst>
+          </p:nvPr>
+        </p:nvSpPr>
+        <p:spPr>
+          <a:xfrm>
+            <a:off x="0" y="0"/>
+            <a:ext cx="12192000" cy="6858000"/>
+          </a:xfrm>
+          <a:prstGeom prst="rect">
+            <a:avLst/>
+          </a:prstGeom>
+          <a:ln>
+            <a:noFill/>
+          </a:ln>
+        </p:spPr>
+        <p:style>
+          <a:lnRef idx="2">
+            <a:schemeClr val="accent1">
+              <a:shade val="50000"/>
+            </a:schemeClr>
+          </a:lnRef>
+          <a:fillRef idx="1">
+            <a:schemeClr val="accent1"/>
+          </a:fillRef>
+          <a:effectRef idx="0">
+            <a:schemeClr val="accent1"/>
+          </a:effectRef>
+          <a:fontRef idx="minor">
+            <a:schemeClr val="lt1"/>
+          </a:fontRef>
+        </p:style>
+        <p:txBody>
+          <a:bodyPr rtlCol="0" anchor="ctr"/>
+          <a:lstStyle/>
+          <a:p>
+            <a:pPr algn="ctr"/>
+            <a:endParaRPr lang="en-US"/>
+          </a:p>
+        </p:txBody>
+      </p:sp>
       <p:sp>
         <p:nvSpPr>
           <p:cNvPr id="2" name="Titel 1"/>
@@ -2979,17 +3050,24 @@
             <p:ph type="ctrTitle"/>
           </p:nvPr>
         </p:nvSpPr>
-        <p:spPr/>
-        <p:txBody>
-          <a:bodyPr/>
-          <a:lstStyle/>
-          <a:p>
-            <a:r>
-              <a:rPr lang="en-GB" dirty="0" smtClean="0"/>
+        <p:spPr>
+          <a:xfrm>
+            <a:off x="6194716" y="739978"/>
+            <a:ext cx="5334930" cy="3004145"/>
+          </a:xfrm>
+        </p:spPr>
+        <p:txBody>
+          <a:bodyPr>
+            <a:normAutofit/>
+          </a:bodyPr>
+          <a:lstStyle/>
+          <a:p>
+            <a:r>
+              <a:rPr lang="en-GB" dirty="0"/>
               <a:t>Mario’s </a:t>
             </a:r>
             <a:r>
-              <a:rPr lang="en-GB" dirty="0" err="1" smtClean="0"/>
+              <a:rPr lang="en-GB" dirty="0" err="1"/>
               <a:t>PizzaBar</a:t>
             </a:r>
             <a:endParaRPr lang="en-GB" dirty="0"/>
@@ -3006,64 +3084,900 @@
             <p:ph type="subTitle" idx="1"/>
           </p:nvPr>
         </p:nvSpPr>
-        <p:spPr/>
-        <p:txBody>
-          <a:bodyPr/>
-          <a:lstStyle/>
-          <a:p>
-            <a:r>
-              <a:rPr lang="en-GB" dirty="0" err="1" smtClean="0"/>
+        <p:spPr>
+          <a:xfrm>
+            <a:off x="6194715" y="3836197"/>
+            <a:ext cx="5334931" cy="2189214"/>
+          </a:xfrm>
+        </p:spPr>
+        <p:txBody>
+          <a:bodyPr>
+            <a:normAutofit/>
+          </a:bodyPr>
+          <a:lstStyle/>
+          <a:p>
+            <a:r>
+              <a:rPr lang="en-GB" dirty="0" err="1"/>
               <a:t>Gruppe</a:t>
             </a:r>
             <a:r>
-              <a:rPr lang="en-GB" dirty="0" smtClean="0"/>
+              <a:rPr lang="en-GB" dirty="0"/>
               <a:t> 2:</a:t>
             </a:r>
             <a:br>
-              <a:rPr lang="en-GB" dirty="0" smtClean="0"/>
+              <a:rPr lang="en-GB" dirty="0"/>
             </a:br>
             <a:r>
-              <a:rPr lang="en-GB" dirty="0" smtClean="0">
+              <a:rPr lang="en-GB" dirty="0">
                 <a:hlinkClick r:id="rId2"/>
               </a:rPr>
               <a:t>https://github.com/Geofery/MariosPizzabar.git</a:t>
             </a:r>
-            <a:endParaRPr lang="en-GB" dirty="0" smtClean="0"/>
-          </a:p>
-          <a:p>
-            <a:r>
-              <a:rPr lang="en-GB" dirty="0" smtClean="0"/>
+            <a:endParaRPr lang="en-GB" dirty="0"/>
+          </a:p>
+          <a:p>
+            <a:r>
+              <a:rPr lang="en-GB" dirty="0"/>
               <a:t>Jens-k-m-m, </a:t>
             </a:r>
             <a:r>
-              <a:rPr lang="en-GB" dirty="0" err="1" smtClean="0"/>
+              <a:rPr lang="en-GB" dirty="0" err="1"/>
               <a:t>TheeCapain</a:t>
             </a:r>
             <a:r>
-              <a:rPr lang="en-GB" dirty="0" smtClean="0"/>
+              <a:rPr lang="en-GB" dirty="0"/>
               <a:t>, </a:t>
             </a:r>
             <a:r>
-              <a:rPr lang="en-GB" dirty="0" err="1" smtClean="0"/>
+              <a:rPr lang="en-GB" dirty="0" err="1"/>
               <a:t>Geofery</a:t>
             </a:r>
             <a:r>
-              <a:rPr lang="en-GB" dirty="0" smtClean="0"/>
+              <a:rPr lang="en-GB" dirty="0"/>
               <a:t> </a:t>
             </a:r>
             <a:r>
-              <a:rPr lang="en-GB" dirty="0" err="1" smtClean="0"/>
+              <a:rPr lang="en-GB" dirty="0" err="1"/>
               <a:t>og</a:t>
             </a:r>
             <a:r>
-              <a:rPr lang="en-GB" dirty="0" smtClean="0"/>
+              <a:rPr lang="en-GB" dirty="0"/>
               <a:t> </a:t>
             </a:r>
             <a:r>
-              <a:rPr lang="en-GB" dirty="0" err="1" smtClean="0"/>
+              <a:rPr lang="en-GB" dirty="0" err="1"/>
               <a:t>MichalaNybroe</a:t>
             </a:r>
             <a:endParaRPr lang="en-GB" dirty="0"/>
+          </a:p>
+        </p:txBody>
+      </p:sp>
+      <p:sp>
+        <p:nvSpPr>
+          <p:cNvPr id="11" name="Freeform: Shape 10">
+            <a:extLst>
+              <a:ext uri="{FF2B5EF4-FFF2-40B4-BE49-F238E27FC236}">
+                <a16:creationId xmlns:a16="http://schemas.microsoft.com/office/drawing/2014/main" id="{658970D8-8D1D-4B5C-894B-E871CC86543D}"/>
+              </a:ext>
+              <a:ext uri="{C183D7F6-B498-43B3-948B-1728B52AA6E4}">
+                <adec:decorative xmlns:adec="http://schemas.microsoft.com/office/drawing/2017/decorative" val="1"/>
+              </a:ext>
+            </a:extLst>
+          </p:cNvPr>
+          <p:cNvSpPr>
+            <a:spLocks noGrp="1" noRot="1" noChangeAspect="1" noMove="1" noResize="1" noEditPoints="1" noAdjustHandles="1" noChangeArrowheads="1" noChangeShapeType="1" noTextEdit="1"/>
+          </p:cNvSpPr>
+          <p:nvPr>
+            <p:extLst>
+              <p:ext uri="{386F3935-93C4-4BCD-93E2-E3B085C9AB24}">
+                <p16:designElem xmlns:p16="http://schemas.microsoft.com/office/powerpoint/2015/main" val="1"/>
+              </p:ext>
+            </p:extLst>
+          </p:nvPr>
+        </p:nvSpPr>
+        <p:spPr>
+          <a:xfrm flipH="1">
+            <a:off x="530529" y="1"/>
+            <a:ext cx="1155142" cy="591009"/>
+          </a:xfrm>
+          <a:custGeom>
+            <a:avLst/>
+            <a:gdLst>
+              <a:gd name="connsiteX0" fmla="*/ 1355 w 1155142"/>
+              <a:gd name="connsiteY0" fmla="*/ 0 h 591009"/>
+              <a:gd name="connsiteX1" fmla="*/ 1153787 w 1155142"/>
+              <a:gd name="connsiteY1" fmla="*/ 0 h 591009"/>
+              <a:gd name="connsiteX2" fmla="*/ 1155142 w 1155142"/>
+              <a:gd name="connsiteY2" fmla="*/ 13438 h 591009"/>
+              <a:gd name="connsiteX3" fmla="*/ 577571 w 1155142"/>
+              <a:gd name="connsiteY3" fmla="*/ 591009 h 591009"/>
+              <a:gd name="connsiteX4" fmla="*/ 0 w 1155142"/>
+              <a:gd name="connsiteY4" fmla="*/ 13438 h 591009"/>
+            </a:gdLst>
+            <a:ahLst/>
+            <a:cxnLst>
+              <a:cxn ang="0">
+                <a:pos x="connsiteX0" y="connsiteY0"/>
+              </a:cxn>
+              <a:cxn ang="0">
+                <a:pos x="connsiteX1" y="connsiteY1"/>
+              </a:cxn>
+              <a:cxn ang="0">
+                <a:pos x="connsiteX2" y="connsiteY2"/>
+              </a:cxn>
+              <a:cxn ang="0">
+                <a:pos x="connsiteX3" y="connsiteY3"/>
+              </a:cxn>
+              <a:cxn ang="0">
+                <a:pos x="connsiteX4" y="connsiteY4"/>
+              </a:cxn>
+            </a:cxnLst>
+            <a:rect l="l" t="t" r="r" b="b"/>
+            <a:pathLst>
+              <a:path w="1155142" h="591009">
+                <a:moveTo>
+                  <a:pt x="1355" y="0"/>
+                </a:moveTo>
+                <a:lnTo>
+                  <a:pt x="1153787" y="0"/>
+                </a:lnTo>
+                <a:lnTo>
+                  <a:pt x="1155142" y="13438"/>
+                </a:lnTo>
+                <a:cubicBezTo>
+                  <a:pt x="1155142" y="332422"/>
+                  <a:pt x="896555" y="591009"/>
+                  <a:pt x="577571" y="591009"/>
+                </a:cubicBezTo>
+                <a:cubicBezTo>
+                  <a:pt x="258587" y="591009"/>
+                  <a:pt x="0" y="332422"/>
+                  <a:pt x="0" y="13438"/>
+                </a:cubicBezTo>
+                <a:close/>
+              </a:path>
+            </a:pathLst>
+          </a:custGeom>
+          <a:solidFill>
+            <a:schemeClr val="accent5"/>
+          </a:solidFill>
+          <a:ln>
+            <a:noFill/>
+          </a:ln>
+        </p:spPr>
+        <p:style>
+          <a:lnRef idx="2">
+            <a:schemeClr val="accent1">
+              <a:shade val="50000"/>
+            </a:schemeClr>
+          </a:lnRef>
+          <a:fillRef idx="1">
+            <a:schemeClr val="accent1"/>
+          </a:fillRef>
+          <a:effectRef idx="0">
+            <a:schemeClr val="accent1"/>
+          </a:effectRef>
+          <a:fontRef idx="minor">
+            <a:schemeClr val="lt1"/>
+          </a:fontRef>
+        </p:style>
+        <p:txBody>
+          <a:bodyPr wrap="square" rtlCol="0" anchor="ctr">
+            <a:noAutofit/>
+          </a:bodyPr>
+          <a:lstStyle/>
+          <a:p>
+            <a:pPr algn="ctr"/>
+            <a:endParaRPr lang="en-US"/>
+          </a:p>
+        </p:txBody>
+      </p:sp>
+      <p:sp>
+        <p:nvSpPr>
+          <p:cNvPr id="13" name="Freeform: Shape 12">
+            <a:extLst>
+              <a:ext uri="{FF2B5EF4-FFF2-40B4-BE49-F238E27FC236}">
+                <a16:creationId xmlns:a16="http://schemas.microsoft.com/office/drawing/2014/main" id="{F227E5B6-9132-43CA-B503-37A18562ADF2}"/>
+              </a:ext>
+              <a:ext uri="{C183D7F6-B498-43B3-948B-1728B52AA6E4}">
+                <adec:decorative xmlns:adec="http://schemas.microsoft.com/office/drawing/2017/decorative" val="1"/>
+              </a:ext>
+            </a:extLst>
+          </p:cNvPr>
+          <p:cNvSpPr>
+            <a:spLocks noGrp="1" noRot="1" noChangeAspect="1" noMove="1" noResize="1" noEditPoints="1" noAdjustHandles="1" noChangeArrowheads="1" noChangeShapeType="1" noTextEdit="1"/>
+          </p:cNvSpPr>
+          <p:nvPr>
+            <p:extLst>
+              <p:ext uri="{386F3935-93C4-4BCD-93E2-E3B085C9AB24}">
+                <p16:designElem xmlns:p16="http://schemas.microsoft.com/office/powerpoint/2015/main" val="1"/>
+              </p:ext>
+            </p:extLst>
+          </p:nvPr>
+        </p:nvSpPr>
+        <p:spPr>
+          <a:xfrm flipH="1">
+            <a:off x="4349052" y="0"/>
+            <a:ext cx="1737401" cy="959536"/>
+          </a:xfrm>
+          <a:custGeom>
+            <a:avLst/>
+            <a:gdLst>
+              <a:gd name="connsiteX0" fmla="*/ 0 w 1737401"/>
+              <a:gd name="connsiteY0" fmla="*/ 0 h 959536"/>
+              <a:gd name="connsiteX1" fmla="*/ 123825 w 1737401"/>
+              <a:gd name="connsiteY1" fmla="*/ 0 h 959536"/>
+              <a:gd name="connsiteX2" fmla="*/ 123825 w 1737401"/>
+              <a:gd name="connsiteY2" fmla="*/ 790277 h 959536"/>
+              <a:gd name="connsiteX3" fmla="*/ 1490095 w 1737401"/>
+              <a:gd name="connsiteY3" fmla="*/ 0 h 959536"/>
+              <a:gd name="connsiteX4" fmla="*/ 1737401 w 1737401"/>
+              <a:gd name="connsiteY4" fmla="*/ 0 h 959536"/>
+              <a:gd name="connsiteX5" fmla="*/ 92869 w 1737401"/>
+              <a:gd name="connsiteY5" fmla="*/ 951249 h 959536"/>
+              <a:gd name="connsiteX6" fmla="*/ 61913 w 1737401"/>
+              <a:gd name="connsiteY6" fmla="*/ 959536 h 959536"/>
+              <a:gd name="connsiteX7" fmla="*/ 0 w 1737401"/>
+              <a:gd name="connsiteY7" fmla="*/ 897624 h 959536"/>
+            </a:gdLst>
+            <a:ahLst/>
+            <a:cxnLst>
+              <a:cxn ang="0">
+                <a:pos x="connsiteX0" y="connsiteY0"/>
+              </a:cxn>
+              <a:cxn ang="0">
+                <a:pos x="connsiteX1" y="connsiteY1"/>
+              </a:cxn>
+              <a:cxn ang="0">
+                <a:pos x="connsiteX2" y="connsiteY2"/>
+              </a:cxn>
+              <a:cxn ang="0">
+                <a:pos x="connsiteX3" y="connsiteY3"/>
+              </a:cxn>
+              <a:cxn ang="0">
+                <a:pos x="connsiteX4" y="connsiteY4"/>
+              </a:cxn>
+              <a:cxn ang="0">
+                <a:pos x="connsiteX5" y="connsiteY5"/>
+              </a:cxn>
+              <a:cxn ang="0">
+                <a:pos x="connsiteX6" y="connsiteY6"/>
+              </a:cxn>
+              <a:cxn ang="0">
+                <a:pos x="connsiteX7" y="connsiteY7"/>
+              </a:cxn>
+            </a:cxnLst>
+            <a:rect l="l" t="t" r="r" b="b"/>
+            <a:pathLst>
+              <a:path w="1737401" h="959536">
+                <a:moveTo>
+                  <a:pt x="0" y="0"/>
+                </a:moveTo>
+                <a:lnTo>
+                  <a:pt x="123825" y="0"/>
+                </a:lnTo>
+                <a:lnTo>
+                  <a:pt x="123825" y="790277"/>
+                </a:lnTo>
+                <a:lnTo>
+                  <a:pt x="1490095" y="0"/>
+                </a:lnTo>
+                <a:lnTo>
+                  <a:pt x="1737401" y="0"/>
+                </a:lnTo>
+                <a:lnTo>
+                  <a:pt x="92869" y="951249"/>
+                </a:lnTo>
+                <a:cubicBezTo>
+                  <a:pt x="83458" y="956688"/>
+                  <a:pt x="72780" y="959546"/>
+                  <a:pt x="61913" y="959536"/>
+                </a:cubicBezTo>
+                <a:cubicBezTo>
+                  <a:pt x="27719" y="959536"/>
+                  <a:pt x="0" y="931818"/>
+                  <a:pt x="0" y="897624"/>
+                </a:cubicBezTo>
+                <a:close/>
+              </a:path>
+            </a:pathLst>
+          </a:custGeom>
+          <a:solidFill>
+            <a:schemeClr val="accent6"/>
+          </a:solidFill>
+          <a:ln w="9525" cap="flat">
+            <a:noFill/>
+            <a:prstDash val="solid"/>
+            <a:miter/>
+          </a:ln>
+        </p:spPr>
+        <p:txBody>
+          <a:bodyPr rtlCol="0" anchor="ctr"/>
+          <a:lstStyle/>
+          <a:p>
+            <a:endParaRPr lang="en-US"/>
+          </a:p>
+        </p:txBody>
+      </p:sp>
+      <p:sp>
+        <p:nvSpPr>
+          <p:cNvPr id="15" name="Freeform: Shape 14">
+            <a:extLst>
+              <a:ext uri="{FF2B5EF4-FFF2-40B4-BE49-F238E27FC236}">
+                <a16:creationId xmlns:a16="http://schemas.microsoft.com/office/drawing/2014/main" id="{03C2051E-A88D-48E5-BACF-AAED17892722}"/>
+              </a:ext>
+              <a:ext uri="{C183D7F6-B498-43B3-948B-1728B52AA6E4}">
+                <adec:decorative xmlns:adec="http://schemas.microsoft.com/office/drawing/2017/decorative" val="1"/>
+              </a:ext>
+            </a:extLst>
+          </p:cNvPr>
+          <p:cNvSpPr>
+            <a:spLocks noGrp="1" noRot="1" noChangeAspect="1" noMove="1" noResize="1" noEditPoints="1" noAdjustHandles="1" noChangeArrowheads="1" noChangeShapeType="1" noTextEdit="1"/>
+          </p:cNvSpPr>
+          <p:nvPr>
+            <p:extLst>
+              <p:ext uri="{386F3935-93C4-4BCD-93E2-E3B085C9AB24}">
+                <p16:designElem xmlns:p16="http://schemas.microsoft.com/office/powerpoint/2015/main" val="1"/>
+              </p:ext>
+            </p:extLst>
+          </p:nvPr>
+        </p:nvSpPr>
+        <p:spPr>
+          <a:xfrm flipH="1">
+            <a:off x="0" y="2916245"/>
+            <a:ext cx="159741" cy="552996"/>
+          </a:xfrm>
+          <a:custGeom>
+            <a:avLst/>
+            <a:gdLst>
+              <a:gd name="connsiteX0" fmla="*/ 159741 w 159741"/>
+              <a:gd name="connsiteY0" fmla="*/ 0 h 552996"/>
+              <a:gd name="connsiteX1" fmla="*/ 159741 w 159741"/>
+              <a:gd name="connsiteY1" fmla="*/ 552996 h 552996"/>
+              <a:gd name="connsiteX2" fmla="*/ 141849 w 159741"/>
+              <a:gd name="connsiteY2" fmla="*/ 543285 h 552996"/>
+              <a:gd name="connsiteX3" fmla="*/ 0 w 159741"/>
+              <a:gd name="connsiteY3" fmla="*/ 276498 h 552996"/>
+              <a:gd name="connsiteX4" fmla="*/ 141849 w 159741"/>
+              <a:gd name="connsiteY4" fmla="*/ 9711 h 552996"/>
+            </a:gdLst>
+            <a:ahLst/>
+            <a:cxnLst>
+              <a:cxn ang="0">
+                <a:pos x="connsiteX0" y="connsiteY0"/>
+              </a:cxn>
+              <a:cxn ang="0">
+                <a:pos x="connsiteX1" y="connsiteY1"/>
+              </a:cxn>
+              <a:cxn ang="0">
+                <a:pos x="connsiteX2" y="connsiteY2"/>
+              </a:cxn>
+              <a:cxn ang="0">
+                <a:pos x="connsiteX3" y="connsiteY3"/>
+              </a:cxn>
+              <a:cxn ang="0">
+                <a:pos x="connsiteX4" y="connsiteY4"/>
+              </a:cxn>
+            </a:cxnLst>
+            <a:rect l="l" t="t" r="r" b="b"/>
+            <a:pathLst>
+              <a:path w="159741" h="552996">
+                <a:moveTo>
+                  <a:pt x="159741" y="0"/>
+                </a:moveTo>
+                <a:lnTo>
+                  <a:pt x="159741" y="552996"/>
+                </a:lnTo>
+                <a:lnTo>
+                  <a:pt x="141849" y="543285"/>
+                </a:lnTo>
+                <a:cubicBezTo>
+                  <a:pt x="56268" y="485467"/>
+                  <a:pt x="0" y="387554"/>
+                  <a:pt x="0" y="276498"/>
+                </a:cubicBezTo>
+                <a:cubicBezTo>
+                  <a:pt x="0" y="165443"/>
+                  <a:pt x="56268" y="67529"/>
+                  <a:pt x="141849" y="9711"/>
+                </a:cubicBezTo>
+                <a:close/>
+              </a:path>
+            </a:pathLst>
+          </a:custGeom>
+          <a:solidFill>
+            <a:schemeClr val="accent2"/>
+          </a:solidFill>
+          <a:ln w="127000">
+            <a:noFill/>
+          </a:ln>
+        </p:spPr>
+        <p:style>
+          <a:lnRef idx="2">
+            <a:schemeClr val="accent1">
+              <a:shade val="50000"/>
+            </a:schemeClr>
+          </a:lnRef>
+          <a:fillRef idx="1">
+            <a:schemeClr val="accent1"/>
+          </a:fillRef>
+          <a:effectRef idx="0">
+            <a:schemeClr val="accent1"/>
+          </a:effectRef>
+          <a:fontRef idx="minor">
+            <a:schemeClr val="lt1"/>
+          </a:fontRef>
+        </p:style>
+        <p:txBody>
+          <a:bodyPr wrap="square" rtlCol="0" anchor="ctr">
+            <a:noAutofit/>
+          </a:bodyPr>
+          <a:lstStyle/>
+          <a:p>
+            <a:pPr algn="ctr"/>
+            <a:endParaRPr lang="en-US"/>
+          </a:p>
+        </p:txBody>
+      </p:sp>
+      <p:sp>
+        <p:nvSpPr>
+          <p:cNvPr id="17" name="Freeform: Shape 16">
+            <a:extLst>
+              <a:ext uri="{FF2B5EF4-FFF2-40B4-BE49-F238E27FC236}">
+                <a16:creationId xmlns:a16="http://schemas.microsoft.com/office/drawing/2014/main" id="{7821A508-2985-4905-874A-527429BAABFA}"/>
+              </a:ext>
+              <a:ext uri="{C183D7F6-B498-43B3-948B-1728B52AA6E4}">
+                <adec:decorative xmlns:adec="http://schemas.microsoft.com/office/drawing/2017/decorative" val="1"/>
+              </a:ext>
+            </a:extLst>
+          </p:cNvPr>
+          <p:cNvSpPr>
+            <a:spLocks noGrp="1" noRot="1" noChangeAspect="1" noMove="1" noResize="1" noEditPoints="1" noAdjustHandles="1" noChangeArrowheads="1" noChangeShapeType="1" noTextEdit="1"/>
+          </p:cNvSpPr>
+          <p:nvPr>
+            <p:extLst>
+              <p:ext uri="{386F3935-93C4-4BCD-93E2-E3B085C9AB24}">
+                <p16:designElem xmlns:p16="http://schemas.microsoft.com/office/powerpoint/2015/main" val="1"/>
+              </p:ext>
+            </p:extLst>
+          </p:nvPr>
+        </p:nvSpPr>
+        <p:spPr>
+          <a:xfrm flipH="1">
+            <a:off x="0" y="5835649"/>
+            <a:ext cx="1548180" cy="1022351"/>
+          </a:xfrm>
+          <a:custGeom>
+            <a:avLst/>
+            <a:gdLst>
+              <a:gd name="connsiteX0" fmla="*/ 61913 w 1548180"/>
+              <a:gd name="connsiteY0" fmla="*/ 0 h 1022351"/>
+              <a:gd name="connsiteX1" fmla="*/ 1548180 w 1548180"/>
+              <a:gd name="connsiteY1" fmla="*/ 0 h 1022351"/>
+              <a:gd name="connsiteX2" fmla="*/ 1548180 w 1548180"/>
+              <a:gd name="connsiteY2" fmla="*/ 123825 h 1022351"/>
+              <a:gd name="connsiteX3" fmla="*/ 123825 w 1548180"/>
+              <a:gd name="connsiteY3" fmla="*/ 123825 h 1022351"/>
+              <a:gd name="connsiteX4" fmla="*/ 123825 w 1548180"/>
+              <a:gd name="connsiteY4" fmla="*/ 1022351 h 1022351"/>
+              <a:gd name="connsiteX5" fmla="*/ 0 w 1548180"/>
+              <a:gd name="connsiteY5" fmla="*/ 1022351 h 1022351"/>
+              <a:gd name="connsiteX6" fmla="*/ 0 w 1548180"/>
+              <a:gd name="connsiteY6" fmla="*/ 61913 h 1022351"/>
+              <a:gd name="connsiteX7" fmla="*/ 61913 w 1548180"/>
+              <a:gd name="connsiteY7" fmla="*/ 0 h 1022351"/>
+            </a:gdLst>
+            <a:ahLst/>
+            <a:cxnLst>
+              <a:cxn ang="0">
+                <a:pos x="connsiteX0" y="connsiteY0"/>
+              </a:cxn>
+              <a:cxn ang="0">
+                <a:pos x="connsiteX1" y="connsiteY1"/>
+              </a:cxn>
+              <a:cxn ang="0">
+                <a:pos x="connsiteX2" y="connsiteY2"/>
+              </a:cxn>
+              <a:cxn ang="0">
+                <a:pos x="connsiteX3" y="connsiteY3"/>
+              </a:cxn>
+              <a:cxn ang="0">
+                <a:pos x="connsiteX4" y="connsiteY4"/>
+              </a:cxn>
+              <a:cxn ang="0">
+                <a:pos x="connsiteX5" y="connsiteY5"/>
+              </a:cxn>
+              <a:cxn ang="0">
+                <a:pos x="connsiteX6" y="connsiteY6"/>
+              </a:cxn>
+              <a:cxn ang="0">
+                <a:pos x="connsiteX7" y="connsiteY7"/>
+              </a:cxn>
+            </a:cxnLst>
+            <a:rect l="l" t="t" r="r" b="b"/>
+            <a:pathLst>
+              <a:path w="1548180" h="1022351">
+                <a:moveTo>
+                  <a:pt x="61913" y="0"/>
+                </a:moveTo>
+                <a:lnTo>
+                  <a:pt x="1548180" y="0"/>
+                </a:lnTo>
+                <a:lnTo>
+                  <a:pt x="1548180" y="123825"/>
+                </a:lnTo>
+                <a:lnTo>
+                  <a:pt x="123825" y="123825"/>
+                </a:lnTo>
+                <a:lnTo>
+                  <a:pt x="123825" y="1022351"/>
+                </a:lnTo>
+                <a:lnTo>
+                  <a:pt x="0" y="1022351"/>
+                </a:lnTo>
+                <a:lnTo>
+                  <a:pt x="0" y="61913"/>
+                </a:lnTo>
+                <a:cubicBezTo>
+                  <a:pt x="0" y="27719"/>
+                  <a:pt x="27719" y="0"/>
+                  <a:pt x="61913" y="0"/>
+                </a:cubicBezTo>
+                <a:close/>
+              </a:path>
+            </a:pathLst>
+          </a:custGeom>
+          <a:solidFill>
+            <a:schemeClr val="accent6"/>
+          </a:solidFill>
+          <a:ln w="9525" cap="flat">
+            <a:noFill/>
+            <a:prstDash val="solid"/>
+            <a:miter/>
+          </a:ln>
+        </p:spPr>
+        <p:txBody>
+          <a:bodyPr rtlCol="0" anchor="ctr"/>
+          <a:lstStyle/>
+          <a:p>
+            <a:endParaRPr lang="en-US"/>
+          </a:p>
+        </p:txBody>
+      </p:sp>
+      <p:sp>
+        <p:nvSpPr>
+          <p:cNvPr id="19" name="Freeform: Shape 18">
+            <a:extLst>
+              <a:ext uri="{FF2B5EF4-FFF2-40B4-BE49-F238E27FC236}">
+                <a16:creationId xmlns:a16="http://schemas.microsoft.com/office/drawing/2014/main" id="{D2929CB1-0E3C-4B2D-ADC5-0154FB33BA44}"/>
+              </a:ext>
+              <a:ext uri="{C183D7F6-B498-43B3-948B-1728B52AA6E4}">
+                <adec:decorative xmlns:adec="http://schemas.microsoft.com/office/drawing/2017/decorative" val="1"/>
+              </a:ext>
+            </a:extLst>
+          </p:cNvPr>
+          <p:cNvSpPr>
+            <a:spLocks noGrp="1" noRot="1" noChangeAspect="1" noMove="1" noResize="1" noEditPoints="1" noAdjustHandles="1" noChangeArrowheads="1" noChangeShapeType="1" noTextEdit="1"/>
+          </p:cNvSpPr>
+          <p:nvPr>
+            <p:extLst>
+              <p:ext uri="{386F3935-93C4-4BCD-93E2-E3B085C9AB24}">
+                <p16:designElem xmlns:p16="http://schemas.microsoft.com/office/powerpoint/2015/main" val="1"/>
+              </p:ext>
+            </p:extLst>
+          </p:nvPr>
+        </p:nvSpPr>
+        <p:spPr>
+          <a:xfrm flipH="1">
+            <a:off x="3697761" y="5717906"/>
+            <a:ext cx="1771609" cy="1140095"/>
+          </a:xfrm>
+          <a:custGeom>
+            <a:avLst/>
+            <a:gdLst>
+              <a:gd name="connsiteX0" fmla="*/ 1561721 w 1771609"/>
+              <a:gd name="connsiteY0" fmla="*/ 763041 h 1140095"/>
+              <a:gd name="connsiteX1" fmla="*/ 1623024 w 1771609"/>
+              <a:gd name="connsiteY1" fmla="*/ 792810 h 1140095"/>
+              <a:gd name="connsiteX2" fmla="*/ 1711735 w 1771609"/>
+              <a:gd name="connsiteY2" fmla="*/ 970132 h 1140095"/>
+              <a:gd name="connsiteX3" fmla="*/ 1771609 w 1771609"/>
+              <a:gd name="connsiteY3" fmla="*/ 1140095 h 1140095"/>
+              <a:gd name="connsiteX4" fmla="*/ 1637225 w 1771609"/>
+              <a:gd name="connsiteY4" fmla="*/ 1140095 h 1140095"/>
+              <a:gd name="connsiteX5" fmla="*/ 1594820 w 1771609"/>
+              <a:gd name="connsiteY5" fmla="*/ 1019711 h 1140095"/>
+              <a:gd name="connsiteX6" fmla="*/ 1513200 w 1771609"/>
+              <a:gd name="connsiteY6" fmla="*/ 856627 h 1140095"/>
+              <a:gd name="connsiteX7" fmla="*/ 1538499 w 1771609"/>
+              <a:gd name="connsiteY7" fmla="*/ 770415 h 1140095"/>
+              <a:gd name="connsiteX8" fmla="*/ 1561721 w 1771609"/>
+              <a:gd name="connsiteY8" fmla="*/ 763041 h 1140095"/>
+              <a:gd name="connsiteX9" fmla="*/ 933455 w 1771609"/>
+              <a:gd name="connsiteY9" fmla="*/ 161309 h 1140095"/>
+              <a:gd name="connsiteX10" fmla="*/ 957797 w 1771609"/>
+              <a:gd name="connsiteY10" fmla="*/ 167970 h 1140095"/>
+              <a:gd name="connsiteX11" fmla="*/ 1286982 w 1771609"/>
+              <a:gd name="connsiteY11" fmla="*/ 387616 h 1140095"/>
+              <a:gd name="connsiteX12" fmla="*/ 1293725 w 1771609"/>
+              <a:gd name="connsiteY12" fmla="*/ 477075 h 1140095"/>
+              <a:gd name="connsiteX13" fmla="*/ 1245453 w 1771609"/>
+              <a:gd name="connsiteY13" fmla="*/ 499154 h 1140095"/>
+              <a:gd name="connsiteX14" fmla="*/ 1245167 w 1771609"/>
+              <a:gd name="connsiteY14" fmla="*/ 499154 h 1140095"/>
+              <a:gd name="connsiteX15" fmla="*/ 1203638 w 1771609"/>
+              <a:gd name="connsiteY15" fmla="*/ 484104 h 1140095"/>
+              <a:gd name="connsiteX16" fmla="*/ 900647 w 1771609"/>
+              <a:gd name="connsiteY16" fmla="*/ 281508 h 1140095"/>
+              <a:gd name="connsiteX17" fmla="*/ 872454 w 1771609"/>
+              <a:gd name="connsiteY17" fmla="*/ 196164 h 1140095"/>
+              <a:gd name="connsiteX18" fmla="*/ 933455 w 1771609"/>
+              <a:gd name="connsiteY18" fmla="*/ 161309 h 1140095"/>
+              <a:gd name="connsiteX19" fmla="*/ 256260 w 1771609"/>
+              <a:gd name="connsiteY19" fmla="*/ 29 h 1140095"/>
+              <a:gd name="connsiteX20" fmla="*/ 454020 w 1771609"/>
+              <a:gd name="connsiteY20" fmla="*/ 13474 h 1140095"/>
+              <a:gd name="connsiteX21" fmla="*/ 509236 w 1771609"/>
+              <a:gd name="connsiteY21" fmla="*/ 84182 h 1140095"/>
+              <a:gd name="connsiteX22" fmla="*/ 445829 w 1771609"/>
+              <a:gd name="connsiteY22" fmla="*/ 139871 h 1140095"/>
+              <a:gd name="connsiteX23" fmla="*/ 437447 w 1771609"/>
+              <a:gd name="connsiteY23" fmla="*/ 139395 h 1140095"/>
+              <a:gd name="connsiteX24" fmla="*/ 73211 w 1771609"/>
+              <a:gd name="connsiteY24" fmla="*/ 137204 h 1140095"/>
+              <a:gd name="connsiteX25" fmla="*/ 749 w 1771609"/>
+              <a:gd name="connsiteY25" fmla="*/ 84082 h 1140095"/>
+              <a:gd name="connsiteX26" fmla="*/ 53871 w 1771609"/>
+              <a:gd name="connsiteY26" fmla="*/ 11621 h 1140095"/>
+              <a:gd name="connsiteX27" fmla="*/ 58352 w 1771609"/>
+              <a:gd name="connsiteY27" fmla="*/ 11093 h 1140095"/>
+              <a:gd name="connsiteX28" fmla="*/ 256260 w 1771609"/>
+              <a:gd name="connsiteY28" fmla="*/ 29 h 1140095"/>
+            </a:gdLst>
+            <a:ahLst/>
+            <a:cxnLst>
+              <a:cxn ang="0">
+                <a:pos x="connsiteX0" y="connsiteY0"/>
+              </a:cxn>
+              <a:cxn ang="0">
+                <a:pos x="connsiteX1" y="connsiteY1"/>
+              </a:cxn>
+              <a:cxn ang="0">
+                <a:pos x="connsiteX2" y="connsiteY2"/>
+              </a:cxn>
+              <a:cxn ang="0">
+                <a:pos x="connsiteX3" y="connsiteY3"/>
+              </a:cxn>
+              <a:cxn ang="0">
+                <a:pos x="connsiteX4" y="connsiteY4"/>
+              </a:cxn>
+              <a:cxn ang="0">
+                <a:pos x="connsiteX5" y="connsiteY5"/>
+              </a:cxn>
+              <a:cxn ang="0">
+                <a:pos x="connsiteX6" y="connsiteY6"/>
+              </a:cxn>
+              <a:cxn ang="0">
+                <a:pos x="connsiteX7" y="connsiteY7"/>
+              </a:cxn>
+              <a:cxn ang="0">
+                <a:pos x="connsiteX8" y="connsiteY8"/>
+              </a:cxn>
+              <a:cxn ang="0">
+                <a:pos x="connsiteX9" y="connsiteY9"/>
+              </a:cxn>
+              <a:cxn ang="0">
+                <a:pos x="connsiteX10" y="connsiteY10"/>
+              </a:cxn>
+              <a:cxn ang="0">
+                <a:pos x="connsiteX11" y="connsiteY11"/>
+              </a:cxn>
+              <a:cxn ang="0">
+                <a:pos x="connsiteX12" y="connsiteY12"/>
+              </a:cxn>
+              <a:cxn ang="0">
+                <a:pos x="connsiteX13" y="connsiteY13"/>
+              </a:cxn>
+              <a:cxn ang="0">
+                <a:pos x="connsiteX14" y="connsiteY14"/>
+              </a:cxn>
+              <a:cxn ang="0">
+                <a:pos x="connsiteX15" y="connsiteY15"/>
+              </a:cxn>
+              <a:cxn ang="0">
+                <a:pos x="connsiteX16" y="connsiteY16"/>
+              </a:cxn>
+              <a:cxn ang="0">
+                <a:pos x="connsiteX17" y="connsiteY17"/>
+              </a:cxn>
+              <a:cxn ang="0">
+                <a:pos x="connsiteX18" y="connsiteY18"/>
+              </a:cxn>
+              <a:cxn ang="0">
+                <a:pos x="connsiteX19" y="connsiteY19"/>
+              </a:cxn>
+              <a:cxn ang="0">
+                <a:pos x="connsiteX20" y="connsiteY20"/>
+              </a:cxn>
+              <a:cxn ang="0">
+                <a:pos x="connsiteX21" y="connsiteY21"/>
+              </a:cxn>
+              <a:cxn ang="0">
+                <a:pos x="connsiteX22" y="connsiteY22"/>
+              </a:cxn>
+              <a:cxn ang="0">
+                <a:pos x="connsiteX23" y="connsiteY23"/>
+              </a:cxn>
+              <a:cxn ang="0">
+                <a:pos x="connsiteX24" y="connsiteY24"/>
+              </a:cxn>
+              <a:cxn ang="0">
+                <a:pos x="connsiteX25" y="connsiteY25"/>
+              </a:cxn>
+              <a:cxn ang="0">
+                <a:pos x="connsiteX26" y="connsiteY26"/>
+              </a:cxn>
+              <a:cxn ang="0">
+                <a:pos x="connsiteX27" y="connsiteY27"/>
+              </a:cxn>
+              <a:cxn ang="0">
+                <a:pos x="connsiteX28" y="connsiteY28"/>
+              </a:cxn>
+            </a:cxnLst>
+            <a:rect l="l" t="t" r="r" b="b"/>
+            <a:pathLst>
+              <a:path w="1771609" h="1140095">
+                <a:moveTo>
+                  <a:pt x="1561721" y="763041"/>
+                </a:moveTo>
+                <a:cubicBezTo>
+                  <a:pt x="1585506" y="760324"/>
+                  <a:pt x="1609722" y="771249"/>
+                  <a:pt x="1623024" y="792810"/>
+                </a:cubicBezTo>
+                <a:cubicBezTo>
+                  <a:pt x="1656300" y="850065"/>
+                  <a:pt x="1685920" y="909291"/>
+                  <a:pt x="1711735" y="970132"/>
+                </a:cubicBezTo>
+                <a:lnTo>
+                  <a:pt x="1771609" y="1140095"/>
+                </a:lnTo>
+                <a:lnTo>
+                  <a:pt x="1637225" y="1140095"/>
+                </a:lnTo>
+                <a:lnTo>
+                  <a:pt x="1594820" y="1019711"/>
+                </a:lnTo>
+                <a:cubicBezTo>
+                  <a:pt x="1571072" y="963753"/>
+                  <a:pt x="1543818" y="909282"/>
+                  <a:pt x="1513200" y="856627"/>
+                </a:cubicBezTo>
+                <a:cubicBezTo>
+                  <a:pt x="1496379" y="825834"/>
+                  <a:pt x="1507704" y="787236"/>
+                  <a:pt x="1538499" y="770415"/>
+                </a:cubicBezTo>
+                <a:cubicBezTo>
+                  <a:pt x="1545912" y="766367"/>
+                  <a:pt x="1553792" y="763946"/>
+                  <a:pt x="1561721" y="763041"/>
+                </a:cubicBezTo>
+                <a:close/>
+                <a:moveTo>
+                  <a:pt x="933455" y="161309"/>
+                </a:moveTo>
+                <a:cubicBezTo>
+                  <a:pt x="941693" y="161855"/>
+                  <a:pt x="949959" y="164025"/>
+                  <a:pt x="957797" y="167970"/>
+                </a:cubicBezTo>
+                <a:cubicBezTo>
+                  <a:pt x="1076184" y="227289"/>
+                  <a:pt x="1186759" y="301068"/>
+                  <a:pt x="1286982" y="387616"/>
+                </a:cubicBezTo>
+                <a:cubicBezTo>
+                  <a:pt x="1313547" y="410457"/>
+                  <a:pt x="1316566" y="450510"/>
+                  <a:pt x="1293725" y="477075"/>
+                </a:cubicBezTo>
+                <a:cubicBezTo>
+                  <a:pt x="1281638" y="491137"/>
+                  <a:pt x="1263998" y="499204"/>
+                  <a:pt x="1245453" y="499154"/>
+                </a:cubicBezTo>
+                <a:lnTo>
+                  <a:pt x="1245167" y="499154"/>
+                </a:lnTo>
+                <a:cubicBezTo>
+                  <a:pt x="1229965" y="499301"/>
+                  <a:pt x="1215220" y="493956"/>
+                  <a:pt x="1203638" y="484104"/>
+                </a:cubicBezTo>
+                <a:cubicBezTo>
+                  <a:pt x="1111407" y="404300"/>
+                  <a:pt x="1009633" y="336248"/>
+                  <a:pt x="900647" y="281508"/>
+                </a:cubicBezTo>
+                <a:cubicBezTo>
+                  <a:pt x="869295" y="265726"/>
+                  <a:pt x="856672" y="227516"/>
+                  <a:pt x="872454" y="196164"/>
+                </a:cubicBezTo>
+                <a:cubicBezTo>
+                  <a:pt x="884290" y="172650"/>
+                  <a:pt x="908742" y="159670"/>
+                  <a:pt x="933455" y="161309"/>
+                </a:cubicBezTo>
+                <a:close/>
+                <a:moveTo>
+                  <a:pt x="256260" y="29"/>
+                </a:moveTo>
+                <a:cubicBezTo>
+                  <a:pt x="322331" y="427"/>
+                  <a:pt x="388378" y="4909"/>
+                  <a:pt x="454020" y="13474"/>
+                </a:cubicBezTo>
+                <a:cubicBezTo>
+                  <a:pt x="488793" y="17752"/>
+                  <a:pt x="513514" y="49409"/>
+                  <a:pt x="509236" y="84182"/>
+                </a:cubicBezTo>
+                <a:cubicBezTo>
+                  <a:pt x="505303" y="116151"/>
+                  <a:pt x="478038" y="140098"/>
+                  <a:pt x="445829" y="139871"/>
+                </a:cubicBezTo>
+                <a:cubicBezTo>
+                  <a:pt x="443027" y="139899"/>
+                  <a:pt x="440227" y="139740"/>
+                  <a:pt x="437447" y="139395"/>
+                </a:cubicBezTo>
+                <a:cubicBezTo>
+                  <a:pt x="316592" y="123615"/>
+                  <a:pt x="194247" y="122878"/>
+                  <a:pt x="73211" y="137204"/>
+                </a:cubicBezTo>
+                <a:cubicBezTo>
+                  <a:pt x="38532" y="142545"/>
+                  <a:pt x="6090" y="118762"/>
+                  <a:pt x="749" y="84082"/>
+                </a:cubicBezTo>
+                <a:cubicBezTo>
+                  <a:pt x="-4591" y="49403"/>
+                  <a:pt x="19192" y="16961"/>
+                  <a:pt x="53871" y="11621"/>
+                </a:cubicBezTo>
+                <a:cubicBezTo>
+                  <a:pt x="55358" y="11392"/>
+                  <a:pt x="56852" y="11216"/>
+                  <a:pt x="58352" y="11093"/>
+                </a:cubicBezTo>
+                <a:cubicBezTo>
+                  <a:pt x="124093" y="3319"/>
+                  <a:pt x="190189" y="-369"/>
+                  <a:pt x="256260" y="29"/>
+                </a:cubicBezTo>
+                <a:close/>
+              </a:path>
+            </a:pathLst>
+          </a:custGeom>
+          <a:solidFill>
+            <a:schemeClr val="accent4"/>
+          </a:solidFill>
+          <a:ln w="9525" cap="flat">
+            <a:noFill/>
+            <a:prstDash val="solid"/>
+            <a:miter/>
+          </a:ln>
+        </p:spPr>
+        <p:txBody>
+          <a:bodyPr rtlCol="0" anchor="ctr"/>
+          <a:lstStyle/>
+          <a:p>
+            <a:endParaRPr lang="en-US"/>
           </a:p>
         </p:txBody>
       </p:sp>
@@ -3075,22 +3989,181 @@
           </p:cNvPicPr>
           <p:nvPr/>
         </p:nvPicPr>
-        <p:blipFill>
+        <p:blipFill rotWithShape="1">
           <a:blip r:embed="rId3"/>
-          <a:stretch>
-            <a:fillRect/>
-          </a:stretch>
+          <a:srcRect t="13575" r="-1" b="-1"/>
+          <a:stretch/>
         </p:blipFill>
         <p:spPr>
           <a:xfrm>
-            <a:off x="91441" y="46615"/>
-            <a:ext cx="3072787" cy="3555424"/>
+            <a:off x="631840" y="598720"/>
+            <a:ext cx="5178249" cy="5178249"/>
           </a:xfrm>
-          <a:prstGeom prst="rect">
+          <a:custGeom>
             <a:avLst/>
-          </a:prstGeom>
+            <a:gdLst/>
+            <a:ahLst/>
+            <a:cxnLst/>
+            <a:rect l="l" t="t" r="r" b="b"/>
+            <a:pathLst>
+              <a:path w="3741748" h="3741748">
+                <a:moveTo>
+                  <a:pt x="1870874" y="0"/>
+                </a:moveTo>
+                <a:cubicBezTo>
+                  <a:pt x="2904129" y="0"/>
+                  <a:pt x="3741748" y="837619"/>
+                  <a:pt x="3741748" y="1870874"/>
+                </a:cubicBezTo>
+                <a:cubicBezTo>
+                  <a:pt x="3741748" y="2904129"/>
+                  <a:pt x="2904129" y="3741748"/>
+                  <a:pt x="1870874" y="3741748"/>
+                </a:cubicBezTo>
+                <a:cubicBezTo>
+                  <a:pt x="837619" y="3741748"/>
+                  <a:pt x="0" y="2904129"/>
+                  <a:pt x="0" y="1870874"/>
+                </a:cubicBezTo>
+                <a:cubicBezTo>
+                  <a:pt x="0" y="837619"/>
+                  <a:pt x="837619" y="0"/>
+                  <a:pt x="1870874" y="0"/>
+                </a:cubicBezTo>
+                <a:close/>
+              </a:path>
+            </a:pathLst>
+          </a:custGeom>
         </p:spPr>
       </p:pic>
+      <p:sp>
+        <p:nvSpPr>
+          <p:cNvPr id="21" name="Freeform: Shape 20">
+            <a:extLst>
+              <a:ext uri="{FF2B5EF4-FFF2-40B4-BE49-F238E27FC236}">
+                <a16:creationId xmlns:a16="http://schemas.microsoft.com/office/drawing/2014/main" id="{5F2F0C84-BE8C-4DC2-A6D3-30349A801D5C}"/>
+              </a:ext>
+              <a:ext uri="{C183D7F6-B498-43B3-948B-1728B52AA6E4}">
+                <adec:decorative xmlns:adec="http://schemas.microsoft.com/office/drawing/2017/decorative" val="1"/>
+              </a:ext>
+            </a:extLst>
+          </p:cNvPr>
+          <p:cNvSpPr>
+            <a:spLocks noGrp="1" noRot="1" noChangeAspect="1" noMove="1" noResize="1" noEditPoints="1" noAdjustHandles="1" noChangeArrowheads="1" noChangeShapeType="1" noTextEdit="1"/>
+          </p:cNvSpPr>
+          <p:nvPr>
+            <p:extLst>
+              <p:ext uri="{386F3935-93C4-4BCD-93E2-E3B085C9AB24}">
+                <p16:designElem xmlns:p16="http://schemas.microsoft.com/office/powerpoint/2015/main" val="1"/>
+              </p:ext>
+            </p:extLst>
+          </p:nvPr>
+        </p:nvSpPr>
+        <p:spPr>
+          <a:xfrm flipH="1">
+            <a:off x="4520513" y="6258756"/>
+            <a:ext cx="1565940" cy="599245"/>
+          </a:xfrm>
+          <a:custGeom>
+            <a:avLst/>
+            <a:gdLst>
+              <a:gd name="connsiteX0" fmla="*/ 782970 w 1565940"/>
+              <a:gd name="connsiteY0" fmla="*/ 0 h 599245"/>
+              <a:gd name="connsiteX1" fmla="*/ 1528042 w 1565940"/>
+              <a:gd name="connsiteY1" fmla="*/ 480469 h 599245"/>
+              <a:gd name="connsiteX2" fmla="*/ 1565940 w 1565940"/>
+              <a:gd name="connsiteY2" fmla="*/ 599245 h 599245"/>
+              <a:gd name="connsiteX3" fmla="*/ 0 w 1565940"/>
+              <a:gd name="connsiteY3" fmla="*/ 599245 h 599245"/>
+              <a:gd name="connsiteX4" fmla="*/ 37898 w 1565940"/>
+              <a:gd name="connsiteY4" fmla="*/ 480469 h 599245"/>
+              <a:gd name="connsiteX5" fmla="*/ 782970 w 1565940"/>
+              <a:gd name="connsiteY5" fmla="*/ 0 h 599245"/>
+            </a:gdLst>
+            <a:ahLst/>
+            <a:cxnLst>
+              <a:cxn ang="0">
+                <a:pos x="connsiteX0" y="connsiteY0"/>
+              </a:cxn>
+              <a:cxn ang="0">
+                <a:pos x="connsiteX1" y="connsiteY1"/>
+              </a:cxn>
+              <a:cxn ang="0">
+                <a:pos x="connsiteX2" y="connsiteY2"/>
+              </a:cxn>
+              <a:cxn ang="0">
+                <a:pos x="connsiteX3" y="connsiteY3"/>
+              </a:cxn>
+              <a:cxn ang="0">
+                <a:pos x="connsiteX4" y="connsiteY4"/>
+              </a:cxn>
+              <a:cxn ang="0">
+                <a:pos x="connsiteX5" y="connsiteY5"/>
+              </a:cxn>
+            </a:cxnLst>
+            <a:rect l="l" t="t" r="r" b="b"/>
+            <a:pathLst>
+              <a:path w="1565940" h="599245">
+                <a:moveTo>
+                  <a:pt x="782970" y="0"/>
+                </a:moveTo>
+                <a:cubicBezTo>
+                  <a:pt x="1117910" y="0"/>
+                  <a:pt x="1405287" y="198118"/>
+                  <a:pt x="1528042" y="480469"/>
+                </a:cubicBezTo>
+                <a:lnTo>
+                  <a:pt x="1565940" y="599245"/>
+                </a:lnTo>
+                <a:lnTo>
+                  <a:pt x="0" y="599245"/>
+                </a:lnTo>
+                <a:lnTo>
+                  <a:pt x="37898" y="480469"/>
+                </a:lnTo>
+                <a:cubicBezTo>
+                  <a:pt x="160653" y="198118"/>
+                  <a:pt x="448030" y="0"/>
+                  <a:pt x="782970" y="0"/>
+                </a:cubicBezTo>
+                <a:close/>
+              </a:path>
+            </a:pathLst>
+          </a:custGeom>
+          <a:solidFill>
+            <a:schemeClr val="accent2"/>
+          </a:solidFill>
+          <a:ln>
+            <a:noFill/>
+          </a:ln>
+        </p:spPr>
+        <p:style>
+          <a:lnRef idx="2">
+            <a:schemeClr val="accent1">
+              <a:shade val="50000"/>
+            </a:schemeClr>
+          </a:lnRef>
+          <a:fillRef idx="1">
+            <a:schemeClr val="accent1"/>
+          </a:fillRef>
+          <a:effectRef idx="0">
+            <a:schemeClr val="accent1"/>
+          </a:effectRef>
+          <a:fontRef idx="minor">
+            <a:schemeClr val="lt1"/>
+          </a:fontRef>
+        </p:style>
+        <p:txBody>
+          <a:bodyPr wrap="square" rtlCol="0" anchor="ctr">
+            <a:noAutofit/>
+          </a:bodyPr>
+          <a:lstStyle/>
+          <a:p>
+            <a:pPr algn="ctr"/>
+            <a:endParaRPr lang="en-US" dirty="0"/>
+          </a:p>
+        </p:txBody>
+      </p:sp>
     </p:spTree>
     <p:extLst>
       <p:ext uri="{BB962C8B-B14F-4D97-AF65-F5344CB8AC3E}">
@@ -3107,6 +4180,14 @@
 <file path=ppt/slides/slide2.xml><?xml version="1.0" encoding="utf-8"?>
 <p:sld xmlns:a="http://schemas.openxmlformats.org/drawingml/2006/main" xmlns:r="http://schemas.openxmlformats.org/officeDocument/2006/relationships" xmlns:p="http://schemas.openxmlformats.org/presentationml/2006/main">
   <p:cSld>
+    <p:bg>
+      <p:bgPr>
+        <a:solidFill>
+          <a:schemeClr val="bg1"/>
+        </a:solidFill>
+        <a:effectLst/>
+      </p:bgPr>
+    </p:bg>
     <p:spTree>
       <p:nvGrpSpPr>
         <p:cNvPr id="1" name=""/>
@@ -3121,6 +4202,129 @@
           <a:chExt cx="0" cy="0"/>
         </a:xfrm>
       </p:grpSpPr>
+      <p:sp useBgFill="1">
+        <p:nvSpPr>
+          <p:cNvPr id="25" name="Rectangle 19">
+            <a:extLst>
+              <a:ext uri="{FF2B5EF4-FFF2-40B4-BE49-F238E27FC236}">
+                <a16:creationId xmlns:a16="http://schemas.microsoft.com/office/drawing/2014/main" id="{C2554CA6-288E-4202-BC52-2E5A8F0C0AED}"/>
+              </a:ext>
+              <a:ext uri="{C183D7F6-B498-43B3-948B-1728B52AA6E4}">
+                <adec:decorative xmlns:adec="http://schemas.microsoft.com/office/drawing/2017/decorative" val="1"/>
+              </a:ext>
+            </a:extLst>
+          </p:cNvPr>
+          <p:cNvSpPr>
+            <a:spLocks noGrp="1" noRot="1" noChangeAspect="1" noMove="1" noResize="1" noEditPoints="1" noAdjustHandles="1" noChangeArrowheads="1" noChangeShapeType="1" noTextEdit="1"/>
+          </p:cNvSpPr>
+          <p:nvPr>
+            <p:extLst>
+              <p:ext uri="{386F3935-93C4-4BCD-93E2-E3B085C9AB24}">
+                <p16:designElem xmlns:p16="http://schemas.microsoft.com/office/powerpoint/2015/main" val="1"/>
+              </p:ext>
+            </p:extLst>
+          </p:nvPr>
+        </p:nvSpPr>
+        <p:spPr>
+          <a:xfrm>
+            <a:off x="3048" y="0"/>
+            <a:ext cx="12188952" cy="6858000"/>
+          </a:xfrm>
+          <a:prstGeom prst="rect">
+            <a:avLst/>
+          </a:prstGeom>
+          <a:ln>
+            <a:noFill/>
+          </a:ln>
+        </p:spPr>
+        <p:style>
+          <a:lnRef idx="2">
+            <a:schemeClr val="accent1">
+              <a:shade val="50000"/>
+            </a:schemeClr>
+          </a:lnRef>
+          <a:fillRef idx="1">
+            <a:schemeClr val="accent1"/>
+          </a:fillRef>
+          <a:effectRef idx="0">
+            <a:schemeClr val="accent1"/>
+          </a:effectRef>
+          <a:fontRef idx="minor">
+            <a:schemeClr val="lt1"/>
+          </a:fontRef>
+        </p:style>
+        <p:txBody>
+          <a:bodyPr rtlCol="0" anchor="ctr"/>
+          <a:lstStyle/>
+          <a:p>
+            <a:pPr algn="ctr"/>
+            <a:endParaRPr lang="en-US"/>
+          </a:p>
+        </p:txBody>
+      </p:sp>
+      <p:sp>
+        <p:nvSpPr>
+          <p:cNvPr id="27" name="Oval 21">
+            <a:extLst>
+              <a:ext uri="{FF2B5EF4-FFF2-40B4-BE49-F238E27FC236}">
+                <a16:creationId xmlns:a16="http://schemas.microsoft.com/office/drawing/2014/main" id="{B10BB131-AC8E-4A8E-A5D1-36260F720C3B}"/>
+              </a:ext>
+              <a:ext uri="{C183D7F6-B498-43B3-948B-1728B52AA6E4}">
+                <adec:decorative xmlns:adec="http://schemas.microsoft.com/office/drawing/2017/decorative" val="1"/>
+              </a:ext>
+            </a:extLst>
+          </p:cNvPr>
+          <p:cNvSpPr>
+            <a:spLocks noGrp="1" noRot="1" noChangeAspect="1" noMove="1" noResize="1" noEditPoints="1" noAdjustHandles="1" noChangeArrowheads="1" noChangeShapeType="1" noTextEdit="1"/>
+          </p:cNvSpPr>
+          <p:nvPr>
+            <p:extLst>
+              <p:ext uri="{386F3935-93C4-4BCD-93E2-E3B085C9AB24}">
+                <p16:designElem xmlns:p16="http://schemas.microsoft.com/office/powerpoint/2015/main" val="1"/>
+              </p:ext>
+            </p:extLst>
+          </p:nvPr>
+        </p:nvSpPr>
+        <p:spPr>
+          <a:xfrm>
+            <a:off x="489189" y="1119031"/>
+            <a:ext cx="4619938" cy="4619938"/>
+          </a:xfrm>
+          <a:prstGeom prst="ellipse">
+            <a:avLst/>
+          </a:prstGeom>
+          <a:solidFill>
+            <a:schemeClr val="accent2"/>
+          </a:solidFill>
+          <a:ln>
+            <a:noFill/>
+          </a:ln>
+        </p:spPr>
+        <p:style>
+          <a:lnRef idx="2">
+            <a:schemeClr val="accent1">
+              <a:shade val="50000"/>
+            </a:schemeClr>
+          </a:lnRef>
+          <a:fillRef idx="1">
+            <a:schemeClr val="accent1"/>
+          </a:fillRef>
+          <a:effectRef idx="0">
+            <a:schemeClr val="accent1"/>
+          </a:effectRef>
+          <a:fontRef idx="minor">
+            <a:schemeClr val="lt1"/>
+          </a:fontRef>
+        </p:style>
+        <p:txBody>
+          <a:bodyPr rtlCol="0" anchor="ctr"/>
+          <a:lstStyle/>
+          <a:p>
+            <a:pPr algn="ctr"/>
+            <a:endParaRPr lang="en-US"/>
+          </a:p>
+        </p:txBody>
+      </p:sp>
       <p:sp>
         <p:nvSpPr>
           <p:cNvPr id="2" name="Titel 1"/>
@@ -3131,22 +4335,218 @@
             <p:ph type="title"/>
           </p:nvPr>
         </p:nvSpPr>
-        <p:spPr/>
-        <p:txBody>
-          <a:bodyPr/>
-          <a:lstStyle/>
-          <a:p>
-            <a:r>
-              <a:rPr lang="en-GB" dirty="0" err="1" smtClean="0"/>
+        <p:spPr>
+          <a:xfrm>
+            <a:off x="1171074" y="1396686"/>
+            <a:ext cx="3240506" cy="4064628"/>
+          </a:xfrm>
+        </p:spPr>
+        <p:txBody>
+          <a:bodyPr>
+            <a:normAutofit/>
+          </a:bodyPr>
+          <a:lstStyle/>
+          <a:p>
+            <a:r>
+              <a:rPr lang="en-GB">
+                <a:solidFill>
+                  <a:srgbClr val="FFFFFF"/>
+                </a:solidFill>
+              </a:rPr>
               <a:t>Risiko</a:t>
             </a:r>
-            <a:endParaRPr lang="en-GB" dirty="0"/>
-          </a:p>
-        </p:txBody>
-      </p:sp>
-      <p:sp>
-        <p:nvSpPr>
-          <p:cNvPr id="3" name="Pladsholder til indhold 2"/>
+          </a:p>
+        </p:txBody>
+      </p:sp>
+      <p:sp>
+        <p:nvSpPr>
+          <p:cNvPr id="24" name="Arc 23">
+            <a:extLst>
+              <a:ext uri="{FF2B5EF4-FFF2-40B4-BE49-F238E27FC236}">
+                <a16:creationId xmlns:a16="http://schemas.microsoft.com/office/drawing/2014/main" id="{5B7778FC-632E-4DCA-A7CB-0D7731CCF970}"/>
+              </a:ext>
+              <a:ext uri="{C183D7F6-B498-43B3-948B-1728B52AA6E4}">
+                <adec:decorative xmlns:adec="http://schemas.microsoft.com/office/drawing/2017/decorative" val="1"/>
+              </a:ext>
+            </a:extLst>
+          </p:cNvPr>
+          <p:cNvSpPr>
+            <a:spLocks noGrp="1" noRot="1" noChangeAspect="1" noMove="1" noResize="1" noEditPoints="1" noAdjustHandles="1" noChangeArrowheads="1" noChangeShapeType="1" noTextEdit="1"/>
+          </p:cNvSpPr>
+          <p:nvPr>
+            <p:extLst>
+              <p:ext uri="{386F3935-93C4-4BCD-93E2-E3B085C9AB24}">
+                <p16:designElem xmlns:p16="http://schemas.microsoft.com/office/powerpoint/2015/main" val="1"/>
+              </p:ext>
+            </p:extLst>
+          </p:nvPr>
+        </p:nvSpPr>
+        <p:spPr>
+          <a:xfrm rot="19809111">
+            <a:off x="8683720" y="941148"/>
+            <a:ext cx="2987899" cy="2987899"/>
+          </a:xfrm>
+          <a:prstGeom prst="arc">
+            <a:avLst>
+              <a:gd name="adj1" fmla="val 15817365"/>
+              <a:gd name="adj2" fmla="val 1781380"/>
+            </a:avLst>
+          </a:prstGeom>
+          <a:ln w="127000" cap="rnd">
+            <a:solidFill>
+              <a:schemeClr val="accent4"/>
+            </a:solidFill>
+            <a:prstDash val="dash"/>
+            <a:miter lim="800000"/>
+          </a:ln>
+        </p:spPr>
+        <p:style>
+          <a:lnRef idx="1">
+            <a:schemeClr val="accent1"/>
+          </a:lnRef>
+          <a:fillRef idx="0">
+            <a:schemeClr val="accent1"/>
+          </a:fillRef>
+          <a:effectRef idx="0">
+            <a:schemeClr val="accent1"/>
+          </a:effectRef>
+          <a:fontRef idx="minor">
+            <a:schemeClr val="tx1"/>
+          </a:fontRef>
+        </p:style>
+        <p:txBody>
+          <a:bodyPr rtlCol="0" anchor="ctr"/>
+          <a:lstStyle/>
+          <a:p>
+            <a:pPr marL="0" marR="0" lvl="0" indent="0" algn="ctr" defTabSz="914400" rtl="0" eaLnBrk="1" fontAlgn="auto" latinLnBrk="0" hangingPunct="1">
+              <a:lnSpc>
+                <a:spcPct val="100000"/>
+              </a:lnSpc>
+              <a:spcBef>
+                <a:spcPts val="0"/>
+              </a:spcBef>
+              <a:spcAft>
+                <a:spcPts val="0"/>
+              </a:spcAft>
+              <a:buClrTx/>
+              <a:buSzTx/>
+              <a:buFontTx/>
+              <a:buNone/>
+              <a:tabLst/>
+              <a:defRPr/>
+            </a:pPr>
+            <a:endParaRPr kumimoji="0" lang="en-US" sz="1800" b="0" i="0" u="none" strike="noStrike" kern="1200" cap="none" spc="0" normalizeH="0" baseline="0" noProof="0">
+              <a:ln>
+                <a:noFill/>
+              </a:ln>
+              <a:solidFill>
+                <a:srgbClr val="000000"/>
+              </a:solidFill>
+              <a:effectLst/>
+              <a:uLnTx/>
+              <a:uFillTx/>
+              <a:latin typeface="Calibri" panose="020F0502020204030204"/>
+              <a:ea typeface="+mn-ea"/>
+              <a:cs typeface="+mn-cs"/>
+            </a:endParaRPr>
+          </a:p>
+        </p:txBody>
+      </p:sp>
+      <p:sp>
+        <p:nvSpPr>
+          <p:cNvPr id="26" name="Oval 25">
+            <a:extLst>
+              <a:ext uri="{FF2B5EF4-FFF2-40B4-BE49-F238E27FC236}">
+                <a16:creationId xmlns:a16="http://schemas.microsoft.com/office/drawing/2014/main" id="{FA23A907-97FB-4A8F-880A-DD77401C4296}"/>
+              </a:ext>
+              <a:ext uri="{C183D7F6-B498-43B3-948B-1728B52AA6E4}">
+                <adec:decorative xmlns:adec="http://schemas.microsoft.com/office/drawing/2017/decorative" val="1"/>
+              </a:ext>
+            </a:extLst>
+          </p:cNvPr>
+          <p:cNvSpPr>
+            <a:spLocks noGrp="1" noRot="1" noChangeAspect="1" noMove="1" noResize="1" noEditPoints="1" noAdjustHandles="1" noChangeArrowheads="1" noChangeShapeType="1" noTextEdit="1"/>
+          </p:cNvSpPr>
+          <p:nvPr>
+            <p:extLst>
+              <p:ext uri="{386F3935-93C4-4BCD-93E2-E3B085C9AB24}">
+                <p16:designElem xmlns:p16="http://schemas.microsoft.com/office/powerpoint/2015/main" val="1"/>
+              </p:ext>
+            </p:extLst>
+          </p:nvPr>
+        </p:nvSpPr>
+        <p:spPr>
+          <a:xfrm>
+            <a:off x="910048" y="4780992"/>
+            <a:ext cx="546100" cy="546100"/>
+          </a:xfrm>
+          <a:prstGeom prst="ellipse">
+            <a:avLst/>
+          </a:prstGeom>
+          <a:solidFill>
+            <a:schemeClr val="accent5"/>
+          </a:solidFill>
+          <a:ln>
+            <a:noFill/>
+          </a:ln>
+        </p:spPr>
+        <p:style>
+          <a:lnRef idx="2">
+            <a:schemeClr val="accent1">
+              <a:shade val="50000"/>
+            </a:schemeClr>
+          </a:lnRef>
+          <a:fillRef idx="1">
+            <a:schemeClr val="accent1"/>
+          </a:fillRef>
+          <a:effectRef idx="0">
+            <a:schemeClr val="accent1"/>
+          </a:effectRef>
+          <a:fontRef idx="minor">
+            <a:schemeClr val="lt1"/>
+          </a:fontRef>
+        </p:style>
+        <p:txBody>
+          <a:bodyPr rtlCol="0" anchor="ctr"/>
+          <a:lstStyle/>
+          <a:p>
+            <a:pPr marL="0" marR="0" lvl="0" indent="0" algn="ctr" defTabSz="914400" rtl="0" eaLnBrk="1" fontAlgn="auto" latinLnBrk="0" hangingPunct="1">
+              <a:lnSpc>
+                <a:spcPct val="100000"/>
+              </a:lnSpc>
+              <a:spcBef>
+                <a:spcPts val="0"/>
+              </a:spcBef>
+              <a:spcAft>
+                <a:spcPts val="0"/>
+              </a:spcAft>
+              <a:buClrTx/>
+              <a:buSzTx/>
+              <a:buFontTx/>
+              <a:buNone/>
+              <a:tabLst/>
+              <a:defRPr/>
+            </a:pPr>
+            <a:endParaRPr kumimoji="0" lang="en-US" sz="1800" b="0" i="0" u="none" strike="noStrike" kern="1200" cap="none" spc="0" normalizeH="0" baseline="0" noProof="0">
+              <a:ln>
+                <a:noFill/>
+              </a:ln>
+              <a:solidFill>
+                <a:srgbClr val="FFFFFF"/>
+              </a:solidFill>
+              <a:effectLst/>
+              <a:uLnTx/>
+              <a:uFillTx/>
+              <a:latin typeface="Calibri" panose="020F0502020204030204"/>
+              <a:ea typeface="+mn-ea"/>
+              <a:cs typeface="+mn-cs"/>
+            </a:endParaRPr>
+          </a:p>
+        </p:txBody>
+      </p:sp>
+      <p:sp>
+        <p:nvSpPr>
+          <p:cNvPr id="15" name="Pladsholder til indhold 2"/>
           <p:cNvSpPr>
             <a:spLocks noGrp="1"/>
           </p:cNvSpPr>
@@ -3154,18 +4554,152 @@
             <p:ph idx="1"/>
           </p:nvPr>
         </p:nvSpPr>
-        <p:spPr/>
-        <p:txBody>
-          <a:bodyPr/>
-          <a:lstStyle/>
-          <a:p>
-            <a:r>
-              <a:rPr lang="en-GB" dirty="0" err="1" smtClean="0"/>
-              <a:t>Tabel</a:t>
-            </a:r>
-            <a:r>
-              <a:rPr lang="en-GB" dirty="0" smtClean="0"/>
-              <a:t>***</a:t>
+        <p:spPr>
+          <a:xfrm>
+            <a:off x="5370153" y="1526033"/>
+            <a:ext cx="5536397" cy="3935281"/>
+          </a:xfrm>
+        </p:spPr>
+        <p:txBody>
+          <a:bodyPr>
+            <a:normAutofit/>
+          </a:bodyPr>
+          <a:lstStyle/>
+          <a:p>
+            <a:r>
+              <a:rPr lang="da-DK" sz="1800" dirty="0">
+                <a:effectLst/>
+                <a:latin typeface="Calibri" panose="020F0502020204030204" pitchFamily="34" charset="0"/>
+                <a:ea typeface="DengXian" panose="020B0503020204020204" pitchFamily="2" charset="-122"/>
+                <a:cs typeface="Times New Roman" panose="02020603050405020304" pitchFamily="18" charset="0"/>
+              </a:rPr>
+              <a:t>Sygdom længerevarende (</a:t>
+            </a:r>
+            <a:r>
+              <a:rPr lang="da-DK" sz="1800" dirty="0" err="1">
+                <a:effectLst/>
+                <a:latin typeface="Calibri" panose="020F0502020204030204" pitchFamily="34" charset="0"/>
+                <a:ea typeface="DengXian" panose="020B0503020204020204" pitchFamily="2" charset="-122"/>
+                <a:cs typeface="Times New Roman" panose="02020603050405020304" pitchFamily="18" charset="0"/>
+              </a:rPr>
+              <a:t>corona</a:t>
+            </a:r>
+            <a:r>
+              <a:rPr lang="da-DK" sz="1800" dirty="0">
+                <a:effectLst/>
+                <a:latin typeface="Calibri" panose="020F0502020204030204" pitchFamily="34" charset="0"/>
+                <a:ea typeface="DengXian" panose="020B0503020204020204" pitchFamily="2" charset="-122"/>
+                <a:cs typeface="Times New Roman" panose="02020603050405020304" pitchFamily="18" charset="0"/>
+              </a:rPr>
+              <a:t>)</a:t>
+            </a:r>
+          </a:p>
+          <a:p>
+            <a:r>
+              <a:rPr lang="da-DK" sz="1800" dirty="0">
+                <a:effectLst/>
+                <a:latin typeface="Calibri" panose="020F0502020204030204" pitchFamily="34" charset="0"/>
+                <a:ea typeface="DengXian" panose="020B0503020204020204" pitchFamily="2" charset="-122"/>
+                <a:cs typeface="Times New Roman" panose="02020603050405020304" pitchFamily="18" charset="0"/>
+              </a:rPr>
+              <a:t>Sygdom kortere forløb</a:t>
+            </a:r>
+            <a:endParaRPr lang="da-DK" sz="1800" dirty="0">
+              <a:latin typeface="Calibri" panose="020F0502020204030204" pitchFamily="34" charset="0"/>
+              <a:ea typeface="DengXian" panose="020B0503020204020204" pitchFamily="2" charset="-122"/>
+              <a:cs typeface="Times New Roman" panose="02020603050405020304" pitchFamily="18" charset="0"/>
+            </a:endParaRPr>
+          </a:p>
+          <a:p>
+            <a:r>
+              <a:rPr lang="da-DK" sz="1800" dirty="0">
+                <a:effectLst/>
+                <a:latin typeface="Calibri" panose="020F0502020204030204" pitchFamily="34" charset="0"/>
+                <a:ea typeface="DengXian" panose="020B0503020204020204" pitchFamily="2" charset="-122"/>
+                <a:cs typeface="Times New Roman" panose="02020603050405020304" pitchFamily="18" charset="0"/>
+              </a:rPr>
+              <a:t>Børn der bliver syge</a:t>
+            </a:r>
+          </a:p>
+          <a:p>
+            <a:r>
+              <a:rPr lang="da-DK" sz="1800" dirty="0">
+                <a:effectLst/>
+                <a:latin typeface="Calibri" panose="020F0502020204030204" pitchFamily="34" charset="0"/>
+                <a:ea typeface="DengXian" panose="020B0503020204020204" pitchFamily="2" charset="-122"/>
+                <a:cs typeface="Times New Roman" panose="02020603050405020304" pitchFamily="18" charset="0"/>
+              </a:rPr>
+              <a:t>GitHub går ned</a:t>
+            </a:r>
+            <a:endParaRPr lang="da-DK" sz="1800" dirty="0">
+              <a:latin typeface="Calibri" panose="020F0502020204030204" pitchFamily="34" charset="0"/>
+              <a:ea typeface="DengXian" panose="020B0503020204020204" pitchFamily="2" charset="-122"/>
+              <a:cs typeface="Times New Roman" panose="02020603050405020304" pitchFamily="18" charset="0"/>
+            </a:endParaRPr>
+          </a:p>
+          <a:p>
+            <a:r>
+              <a:rPr lang="da-DK" sz="1800" dirty="0">
+                <a:effectLst/>
+                <a:latin typeface="Calibri" panose="020F0502020204030204" pitchFamily="34" charset="0"/>
+                <a:ea typeface="DengXian" panose="020B0503020204020204" pitchFamily="2" charset="-122"/>
+                <a:cs typeface="Times New Roman" panose="02020603050405020304" pitchFamily="18" charset="0"/>
+              </a:rPr>
+              <a:t>Vores arbejde forsvinder lokalt</a:t>
+            </a:r>
+          </a:p>
+          <a:p>
+            <a:r>
+              <a:rPr lang="da-DK" sz="1800" dirty="0">
+                <a:effectLst/>
+                <a:latin typeface="Calibri" panose="020F0502020204030204" pitchFamily="34" charset="0"/>
+                <a:ea typeface="DengXian" panose="020B0503020204020204" pitchFamily="2" charset="-122"/>
+                <a:cs typeface="Times New Roman" panose="02020603050405020304" pitchFamily="18" charset="0"/>
+              </a:rPr>
+              <a:t>Lærer ændrer projekt beskrivelse</a:t>
+            </a:r>
+            <a:endParaRPr lang="da-DK" sz="1800" dirty="0">
+              <a:latin typeface="Calibri" panose="020F0502020204030204" pitchFamily="34" charset="0"/>
+              <a:ea typeface="DengXian" panose="020B0503020204020204" pitchFamily="2" charset="-122"/>
+              <a:cs typeface="Times New Roman" panose="02020603050405020304" pitchFamily="18" charset="0"/>
+            </a:endParaRPr>
+          </a:p>
+          <a:p>
+            <a:r>
+              <a:rPr lang="da-DK" sz="1800" dirty="0">
+                <a:effectLst/>
+                <a:latin typeface="Calibri" panose="020F0502020204030204" pitchFamily="34" charset="0"/>
+                <a:ea typeface="DengXian" panose="020B0503020204020204" pitchFamily="2" charset="-122"/>
+                <a:cs typeface="Times New Roman" panose="02020603050405020304" pitchFamily="18" charset="0"/>
+              </a:rPr>
+              <a:t>Mister adgang til Teams</a:t>
+            </a:r>
+          </a:p>
+          <a:p>
+            <a:r>
+              <a:rPr lang="da-DK" sz="1800" dirty="0">
+                <a:effectLst/>
+                <a:latin typeface="Calibri" panose="020F0502020204030204" pitchFamily="34" charset="0"/>
+                <a:ea typeface="DengXian" panose="020B0503020204020204" pitchFamily="2" charset="-122"/>
+                <a:cs typeface="Times New Roman" panose="02020603050405020304" pitchFamily="18" charset="0"/>
+              </a:rPr>
+              <a:t>Gruppemedlem forlader gruppen</a:t>
+            </a:r>
+            <a:endParaRPr lang="da-DK" sz="1800" dirty="0">
+              <a:latin typeface="Calibri" panose="020F0502020204030204" pitchFamily="34" charset="0"/>
+              <a:ea typeface="DengXian" panose="020B0503020204020204" pitchFamily="2" charset="-122"/>
+              <a:cs typeface="Times New Roman" panose="02020603050405020304" pitchFamily="18" charset="0"/>
+            </a:endParaRPr>
+          </a:p>
+          <a:p>
+            <a:r>
+              <a:rPr lang="da-DK" sz="1800" dirty="0">
+                <a:effectLst/>
+                <a:latin typeface="Calibri" panose="020F0502020204030204" pitchFamily="34" charset="0"/>
+                <a:ea typeface="DengXian" panose="020B0503020204020204" pitchFamily="2" charset="-122"/>
+                <a:cs typeface="Times New Roman" panose="02020603050405020304" pitchFamily="18" charset="0"/>
+              </a:rPr>
+              <a:t>Gruppemedlem mister internetforbindelse</a:t>
             </a:r>
             <a:endParaRPr lang="en-GB" dirty="0"/>
           </a:p>
@@ -3203,7 +4737,13 @@
       </p:grpSpPr>
       <p:sp>
         <p:nvSpPr>
-          <p:cNvPr id="2" name="Titel 1"/>
+          <p:cNvPr id="2" name="Titel 1">
+            <a:extLst>
+              <a:ext uri="{FF2B5EF4-FFF2-40B4-BE49-F238E27FC236}">
+                <a16:creationId xmlns:a16="http://schemas.microsoft.com/office/drawing/2014/main" id="{3DA01CDF-0E1E-44C4-B109-ADCBBED63924}"/>
+              </a:ext>
+            </a:extLst>
+          </p:cNvPr>
           <p:cNvSpPr>
             <a:spLocks noGrp="1"/>
           </p:cNvSpPr>
@@ -3216,29 +4756,19 @@
           <a:bodyPr/>
           <a:lstStyle/>
           <a:p>
-            <a:r>
-              <a:rPr lang="en-GB" dirty="0" smtClean="0"/>
-              <a:t>Use-case </a:t>
-            </a:r>
-            <a:r>
-              <a:rPr lang="en-GB" dirty="0" err="1" smtClean="0"/>
-              <a:t>og</a:t>
-            </a:r>
-            <a:r>
-              <a:rPr lang="en-GB" dirty="0" smtClean="0"/>
-              <a:t> </a:t>
-            </a:r>
-            <a:r>
-              <a:rPr lang="en-GB" dirty="0" err="1" smtClean="0"/>
-              <a:t>domænemodel</a:t>
-            </a:r>
-            <a:endParaRPr lang="en-GB" dirty="0"/>
-          </a:p>
-        </p:txBody>
-      </p:sp>
-      <p:sp>
-        <p:nvSpPr>
-          <p:cNvPr id="3" name="Pladsholder til indhold 2"/>
+            <a:endParaRPr lang="da-DK"/>
+          </a:p>
+        </p:txBody>
+      </p:sp>
+      <p:sp>
+        <p:nvSpPr>
+          <p:cNvPr id="3" name="Pladsholder til indhold 2">
+            <a:extLst>
+              <a:ext uri="{FF2B5EF4-FFF2-40B4-BE49-F238E27FC236}">
+                <a16:creationId xmlns:a16="http://schemas.microsoft.com/office/drawing/2014/main" id="{48BA0D9C-016C-4DE2-85FE-71B9A2A5347F}"/>
+              </a:ext>
+            </a:extLst>
+          </p:cNvPr>
           <p:cNvSpPr>
             <a:spLocks noGrp="1"/>
           </p:cNvSpPr>
@@ -3251,68 +4781,44 @@
           <a:bodyPr/>
           <a:lstStyle/>
           <a:p>
-            <a:r>
-              <a:rPr lang="en-GB" dirty="0" err="1" smtClean="0"/>
-              <a:t>Overblik</a:t>
-            </a:r>
-            <a:r>
-              <a:rPr lang="en-GB" dirty="0" smtClean="0"/>
-              <a:t> over </a:t>
-            </a:r>
-            <a:r>
-              <a:rPr lang="en-GB" dirty="0" err="1" smtClean="0"/>
-              <a:t>vores</a:t>
-            </a:r>
-            <a:r>
-              <a:rPr lang="en-GB" dirty="0" smtClean="0"/>
-              <a:t> </a:t>
-            </a:r>
-            <a:r>
-              <a:rPr lang="en-GB" dirty="0" err="1" smtClean="0"/>
-              <a:t>arbejde</a:t>
-            </a:r>
-            <a:r>
-              <a:rPr lang="en-GB" dirty="0" smtClean="0"/>
-              <a:t>/</a:t>
-            </a:r>
-            <a:r>
-              <a:rPr lang="en-GB" dirty="0" err="1" smtClean="0"/>
-              <a:t>forståelse</a:t>
-            </a:r>
-            <a:r>
-              <a:rPr lang="en-GB" dirty="0" smtClean="0"/>
-              <a:t> med Mario</a:t>
-            </a:r>
-          </a:p>
-          <a:p>
-            <a:r>
-              <a:rPr lang="en-GB" dirty="0" err="1" smtClean="0"/>
-              <a:t>Overblik</a:t>
-            </a:r>
-            <a:r>
-              <a:rPr lang="en-GB" dirty="0" smtClean="0"/>
-              <a:t> over </a:t>
-            </a:r>
-            <a:r>
-              <a:rPr lang="en-GB" dirty="0" err="1" smtClean="0"/>
-              <a:t>selve</a:t>
-            </a:r>
-            <a:r>
-              <a:rPr lang="en-GB" dirty="0" smtClean="0"/>
-              <a:t> </a:t>
-            </a:r>
-            <a:r>
-              <a:rPr lang="en-GB" dirty="0" err="1" smtClean="0"/>
-              <a:t>programmet</a:t>
-            </a:r>
-            <a:endParaRPr lang="en-GB" dirty="0"/>
-          </a:p>
-        </p:txBody>
-      </p:sp>
+            <a:endParaRPr lang="da-DK"/>
+          </a:p>
+        </p:txBody>
+      </p:sp>
+      <p:pic>
+        <p:nvPicPr>
+          <p:cNvPr id="5" name="Billede 4">
+            <a:extLst>
+              <a:ext uri="{FF2B5EF4-FFF2-40B4-BE49-F238E27FC236}">
+                <a16:creationId xmlns:a16="http://schemas.microsoft.com/office/drawing/2014/main" id="{53CD8807-E591-4F6D-8F02-8F2D2BB7A86F}"/>
+              </a:ext>
+            </a:extLst>
+          </p:cNvPr>
+          <p:cNvPicPr>
+            <a:picLocks noChangeAspect="1"/>
+          </p:cNvPicPr>
+          <p:nvPr/>
+        </p:nvPicPr>
+        <p:blipFill>
+          <a:blip r:embed="rId2"/>
+          <a:stretch>
+            <a:fillRect/>
+          </a:stretch>
+        </p:blipFill>
+        <p:spPr>
+          <a:xfrm>
+            <a:off x="1182254" y="225078"/>
+            <a:ext cx="9642764" cy="6267797"/>
+          </a:xfrm>
+          <a:prstGeom prst="rect">
+            <a:avLst/>
+          </a:prstGeom>
+        </p:spPr>
+      </p:pic>
     </p:spTree>
     <p:extLst>
       <p:ext uri="{BB962C8B-B14F-4D97-AF65-F5344CB8AC3E}">
-        <p14:creationId xmlns:p14="http://schemas.microsoft.com/office/powerpoint/2010/main" val="1148225437"/>
+        <p14:creationId xmlns:p14="http://schemas.microsoft.com/office/powerpoint/2010/main" val="1762838364"/>
       </p:ext>
     </p:extLst>
   </p:cSld>
@@ -3341,7 +4847,13 @@
       </p:grpSpPr>
       <p:sp>
         <p:nvSpPr>
-          <p:cNvPr id="2" name="Titel 1"/>
+          <p:cNvPr id="2" name="Titel 1">
+            <a:extLst>
+              <a:ext uri="{FF2B5EF4-FFF2-40B4-BE49-F238E27FC236}">
+                <a16:creationId xmlns:a16="http://schemas.microsoft.com/office/drawing/2014/main" id="{D89A4193-9F57-4B38-A757-96E6B29593AC}"/>
+              </a:ext>
+            </a:extLst>
+          </p:cNvPr>
           <p:cNvSpPr>
             <a:spLocks noGrp="1"/>
           </p:cNvSpPr>
@@ -3354,17 +4866,19 @@
           <a:bodyPr/>
           <a:lstStyle/>
           <a:p>
-            <a:r>
-              <a:rPr lang="en-GB" dirty="0" smtClean="0"/>
-              <a:t>Use Case</a:t>
-            </a:r>
-            <a:endParaRPr lang="en-GB" dirty="0"/>
-          </a:p>
-        </p:txBody>
-      </p:sp>
-      <p:sp>
-        <p:nvSpPr>
-          <p:cNvPr id="3" name="Pladsholder til indhold 2"/>
+            <a:endParaRPr lang="da-DK"/>
+          </a:p>
+        </p:txBody>
+      </p:sp>
+      <p:sp>
+        <p:nvSpPr>
+          <p:cNvPr id="3" name="Pladsholder til indhold 2">
+            <a:extLst>
+              <a:ext uri="{FF2B5EF4-FFF2-40B4-BE49-F238E27FC236}">
+                <a16:creationId xmlns:a16="http://schemas.microsoft.com/office/drawing/2014/main" id="{0258FA84-DAD0-42D1-A6DB-64788DB57A4C}"/>
+              </a:ext>
+            </a:extLst>
+          </p:cNvPr>
           <p:cNvSpPr>
             <a:spLocks noGrp="1"/>
           </p:cNvSpPr>
@@ -3377,210 +4891,44 @@
           <a:bodyPr/>
           <a:lstStyle/>
           <a:p>
-            <a:endParaRPr lang="en-GB"/>
-          </a:p>
-        </p:txBody>
-      </p:sp>
+            <a:endParaRPr lang="da-DK"/>
+          </a:p>
+        </p:txBody>
+      </p:sp>
+      <p:pic>
+        <p:nvPicPr>
+          <p:cNvPr id="5" name="Billede 4">
+            <a:extLst>
+              <a:ext uri="{FF2B5EF4-FFF2-40B4-BE49-F238E27FC236}">
+                <a16:creationId xmlns:a16="http://schemas.microsoft.com/office/drawing/2014/main" id="{6ECF3391-B946-4041-88B6-53A36B83B224}"/>
+              </a:ext>
+            </a:extLst>
+          </p:cNvPr>
+          <p:cNvPicPr>
+            <a:picLocks noChangeAspect="1"/>
+          </p:cNvPicPr>
+          <p:nvPr/>
+        </p:nvPicPr>
+        <p:blipFill>
+          <a:blip r:embed="rId2"/>
+          <a:stretch>
+            <a:fillRect/>
+          </a:stretch>
+        </p:blipFill>
+        <p:spPr>
+          <a:xfrm>
+            <a:off x="1081548" y="189271"/>
+            <a:ext cx="10028903" cy="6479458"/>
+          </a:xfrm>
+          <a:prstGeom prst="rect">
+            <a:avLst/>
+          </a:prstGeom>
+        </p:spPr>
+      </p:pic>
     </p:spTree>
     <p:extLst>
       <p:ext uri="{BB962C8B-B14F-4D97-AF65-F5344CB8AC3E}">
-        <p14:creationId xmlns:p14="http://schemas.microsoft.com/office/powerpoint/2010/main" val="1157819209"/>
-      </p:ext>
-    </p:extLst>
-  </p:cSld>
-  <p:clrMapOvr>
-    <a:masterClrMapping/>
-  </p:clrMapOvr>
-</p:sld>
-</file>
-
-<file path=ppt/slides/slide5.xml><?xml version="1.0" encoding="utf-8"?>
-<p:sld xmlns:a="http://schemas.openxmlformats.org/drawingml/2006/main" xmlns:r="http://schemas.openxmlformats.org/officeDocument/2006/relationships" xmlns:p="http://schemas.openxmlformats.org/presentationml/2006/main">
-  <p:cSld>
-    <p:spTree>
-      <p:nvGrpSpPr>
-        <p:cNvPr id="1" name=""/>
-        <p:cNvGrpSpPr/>
-        <p:nvPr/>
-      </p:nvGrpSpPr>
-      <p:grpSpPr>
-        <a:xfrm>
-          <a:off x="0" y="0"/>
-          <a:ext cx="0" cy="0"/>
-          <a:chOff x="0" y="0"/>
-          <a:chExt cx="0" cy="0"/>
-        </a:xfrm>
-      </p:grpSpPr>
-      <p:sp>
-        <p:nvSpPr>
-          <p:cNvPr id="2" name="Titel 1"/>
-          <p:cNvSpPr>
-            <a:spLocks noGrp="1"/>
-          </p:cNvSpPr>
-          <p:nvPr>
-            <p:ph type="title"/>
-          </p:nvPr>
-        </p:nvSpPr>
-        <p:spPr/>
-        <p:txBody>
-          <a:bodyPr/>
-          <a:lstStyle/>
-          <a:p>
-            <a:r>
-              <a:rPr lang="en-GB" dirty="0" err="1" smtClean="0"/>
-              <a:t>Domænemodel</a:t>
-            </a:r>
-            <a:endParaRPr lang="en-GB" dirty="0"/>
-          </a:p>
-        </p:txBody>
-      </p:sp>
-      <p:sp>
-        <p:nvSpPr>
-          <p:cNvPr id="3" name="Pladsholder til indhold 2"/>
-          <p:cNvSpPr>
-            <a:spLocks noGrp="1"/>
-          </p:cNvSpPr>
-          <p:nvPr>
-            <p:ph idx="1"/>
-          </p:nvPr>
-        </p:nvSpPr>
-        <p:spPr/>
-        <p:txBody>
-          <a:bodyPr/>
-          <a:lstStyle/>
-          <a:p>
-            <a:endParaRPr lang="en-GB"/>
-          </a:p>
-        </p:txBody>
-      </p:sp>
-    </p:spTree>
-    <p:extLst>
-      <p:ext uri="{BB962C8B-B14F-4D97-AF65-F5344CB8AC3E}">
-        <p14:creationId xmlns:p14="http://schemas.microsoft.com/office/powerpoint/2010/main" val="701925492"/>
-      </p:ext>
-    </p:extLst>
-  </p:cSld>
-  <p:clrMapOvr>
-    <a:masterClrMapping/>
-  </p:clrMapOvr>
-</p:sld>
-</file>
-
-<file path=ppt/slides/slide6.xml><?xml version="1.0" encoding="utf-8"?>
-<p:sld xmlns:a="http://schemas.openxmlformats.org/drawingml/2006/main" xmlns:r="http://schemas.openxmlformats.org/officeDocument/2006/relationships" xmlns:p="http://schemas.openxmlformats.org/presentationml/2006/main">
-  <p:cSld>
-    <p:spTree>
-      <p:nvGrpSpPr>
-        <p:cNvPr id="1" name=""/>
-        <p:cNvGrpSpPr/>
-        <p:nvPr/>
-      </p:nvGrpSpPr>
-      <p:grpSpPr>
-        <a:xfrm>
-          <a:off x="0" y="0"/>
-          <a:ext cx="0" cy="0"/>
-          <a:chOff x="0" y="0"/>
-          <a:chExt cx="0" cy="0"/>
-        </a:xfrm>
-      </p:grpSpPr>
-      <p:sp>
-        <p:nvSpPr>
-          <p:cNvPr id="2" name="Titel 1"/>
-          <p:cNvSpPr>
-            <a:spLocks noGrp="1"/>
-          </p:cNvSpPr>
-          <p:nvPr>
-            <p:ph type="title"/>
-          </p:nvPr>
-        </p:nvSpPr>
-        <p:spPr/>
-        <p:txBody>
-          <a:bodyPr/>
-          <a:lstStyle/>
-          <a:p>
-            <a:r>
-              <a:rPr lang="en-GB" dirty="0" err="1" smtClean="0"/>
-              <a:t>Særligt</a:t>
-            </a:r>
-            <a:r>
-              <a:rPr lang="en-GB" dirty="0" smtClean="0"/>
-              <a:t> </a:t>
-            </a:r>
-            <a:r>
-              <a:rPr lang="en-GB" dirty="0" err="1" smtClean="0"/>
-              <a:t>ved</a:t>
-            </a:r>
-            <a:r>
-              <a:rPr lang="en-GB" dirty="0" smtClean="0"/>
-              <a:t> </a:t>
-            </a:r>
-            <a:r>
-              <a:rPr lang="en-GB" dirty="0" err="1" smtClean="0"/>
-              <a:t>vores</a:t>
-            </a:r>
-            <a:r>
-              <a:rPr lang="en-GB" dirty="0" smtClean="0"/>
-              <a:t> </a:t>
-            </a:r>
-            <a:r>
-              <a:rPr lang="en-GB" dirty="0" err="1" smtClean="0"/>
-              <a:t>projekt</a:t>
-            </a:r>
-            <a:r>
-              <a:rPr lang="en-GB" dirty="0" smtClean="0"/>
-              <a:t>?</a:t>
-            </a:r>
-            <a:endParaRPr lang="en-GB" dirty="0"/>
-          </a:p>
-        </p:txBody>
-      </p:sp>
-      <p:sp>
-        <p:nvSpPr>
-          <p:cNvPr id="3" name="Pladsholder til indhold 2"/>
-          <p:cNvSpPr>
-            <a:spLocks noGrp="1"/>
-          </p:cNvSpPr>
-          <p:nvPr>
-            <p:ph idx="1"/>
-          </p:nvPr>
-        </p:nvSpPr>
-        <p:spPr/>
-        <p:txBody>
-          <a:bodyPr/>
-          <a:lstStyle/>
-          <a:p>
-            <a:r>
-              <a:rPr lang="en-GB" dirty="0" smtClean="0"/>
-              <a:t>Mange </a:t>
-            </a:r>
-            <a:r>
-              <a:rPr lang="en-GB" dirty="0" err="1" smtClean="0"/>
-              <a:t>Arralister</a:t>
-            </a:r>
-            <a:r>
-              <a:rPr lang="en-GB" dirty="0" smtClean="0"/>
-              <a:t> der </a:t>
-            </a:r>
-            <a:r>
-              <a:rPr lang="en-GB" dirty="0" err="1" smtClean="0"/>
-              <a:t>taler</a:t>
-            </a:r>
-            <a:r>
-              <a:rPr lang="en-GB" dirty="0" smtClean="0"/>
-              <a:t> </a:t>
-            </a:r>
-            <a:r>
-              <a:rPr lang="en-GB" smtClean="0"/>
-              <a:t>sammen</a:t>
-            </a:r>
-            <a:endParaRPr lang="en-GB"/>
-          </a:p>
-        </p:txBody>
-      </p:sp>
-    </p:spTree>
-    <p:extLst>
-      <p:ext uri="{BB962C8B-B14F-4D97-AF65-F5344CB8AC3E}">
-        <p14:creationId xmlns:p14="http://schemas.microsoft.com/office/powerpoint/2010/main" val="3491928019"/>
+        <p14:creationId xmlns:p14="http://schemas.microsoft.com/office/powerpoint/2010/main" val="1708704512"/>
       </p:ext>
     </p:extLst>
   </p:cSld>

</xml_diff>